<commit_message>
Creacion de nuevos retos, el border-radius, backgorund color, display flex
</commit_message>
<xml_diff>
--- a/Clase 2/CURSO DE DESARROLLO WEB 2.pptx
+++ b/Clase 2/CURSO DE DESARROLLO WEB 2.pptx
@@ -4,11 +4,17 @@
   <p:sldMasterIdLst>
     <p:sldMasterId id="2147483696" r:id="rId1"/>
   </p:sldMasterIdLst>
+  <p:notesMasterIdLst>
+    <p:notesMasterId r:id="rId9"/>
+  </p:notesMasterIdLst>
   <p:sldIdLst>
     <p:sldId id="256" r:id="rId2"/>
-    <p:sldId id="259" r:id="rId3"/>
-    <p:sldId id="258" r:id="rId4"/>
-    <p:sldId id="257" r:id="rId5"/>
+    <p:sldId id="258" r:id="rId3"/>
+    <p:sldId id="262" r:id="rId4"/>
+    <p:sldId id="260" r:id="rId5"/>
+    <p:sldId id="261" r:id="rId6"/>
+    <p:sldId id="259" r:id="rId7"/>
+    <p:sldId id="257" r:id="rId8"/>
   </p:sldIdLst>
   <p:sldSz cx="12192000" cy="6858000"/>
   <p:notesSz cx="6858000" cy="9144000"/>
@@ -107,7 +113,446 @@
       </a:defRPr>
     </a:lvl9pPr>
   </p:defaultTextStyle>
+  <p:extLst>
+    <p:ext uri="{EFAFB233-063F-42B5-8137-9DF3F51BA10A}">
+      <p15:sldGuideLst xmlns:p15="http://schemas.microsoft.com/office/powerpoint/2012/main"/>
+    </p:ext>
+  </p:extLst>
 </p:presentation>
+</file>
+
+<file path=ppt/notesMasters/notesMaster1.xml><?xml version="1.0" encoding="utf-8"?>
+<p:notesMaster xmlns:a="http://schemas.openxmlformats.org/drawingml/2006/main" xmlns:r="http://schemas.openxmlformats.org/officeDocument/2006/relationships" xmlns:p="http://schemas.openxmlformats.org/presentationml/2006/main">
+  <p:cSld>
+    <p:bg>
+      <p:bgRef idx="1001">
+        <a:schemeClr val="bg1"/>
+      </p:bgRef>
+    </p:bg>
+    <p:spTree>
+      <p:nvGrpSpPr>
+        <p:cNvPr id="1" name=""/>
+        <p:cNvGrpSpPr/>
+        <p:nvPr/>
+      </p:nvGrpSpPr>
+      <p:grpSpPr>
+        <a:xfrm>
+          <a:off x="0" y="0"/>
+          <a:ext cx="0" cy="0"/>
+          <a:chOff x="0" y="0"/>
+          <a:chExt cx="0" cy="0"/>
+        </a:xfrm>
+      </p:grpSpPr>
+      <p:sp>
+        <p:nvSpPr>
+          <p:cNvPr id="2" name="Marcador de encabezado 1"/>
+          <p:cNvSpPr>
+            <a:spLocks noGrp="1"/>
+          </p:cNvSpPr>
+          <p:nvPr>
+            <p:ph type="hdr" sz="quarter"/>
+          </p:nvPr>
+        </p:nvSpPr>
+        <p:spPr>
+          <a:xfrm>
+            <a:off x="0" y="0"/>
+            <a:ext cx="2971800" cy="458788"/>
+          </a:xfrm>
+          <a:prstGeom prst="rect">
+            <a:avLst/>
+          </a:prstGeom>
+        </p:spPr>
+        <p:txBody>
+          <a:bodyPr vert="horz" lIns="91440" tIns="45720" rIns="91440" bIns="45720" rtlCol="0"/>
+          <a:lstStyle>
+            <a:lvl1pPr algn="l">
+              <a:defRPr sz="1200"/>
+            </a:lvl1pPr>
+          </a:lstStyle>
+          <a:p>
+            <a:endParaRPr lang="es-EC"/>
+          </a:p>
+        </p:txBody>
+      </p:sp>
+      <p:sp>
+        <p:nvSpPr>
+          <p:cNvPr id="3" name="Marcador de fecha 2"/>
+          <p:cNvSpPr>
+            <a:spLocks noGrp="1"/>
+          </p:cNvSpPr>
+          <p:nvPr>
+            <p:ph type="dt" idx="1"/>
+          </p:nvPr>
+        </p:nvSpPr>
+        <p:spPr>
+          <a:xfrm>
+            <a:off x="3884613" y="0"/>
+            <a:ext cx="2971800" cy="458788"/>
+          </a:xfrm>
+          <a:prstGeom prst="rect">
+            <a:avLst/>
+          </a:prstGeom>
+        </p:spPr>
+        <p:txBody>
+          <a:bodyPr vert="horz" lIns="91440" tIns="45720" rIns="91440" bIns="45720" rtlCol="0"/>
+          <a:lstStyle>
+            <a:lvl1pPr algn="r">
+              <a:defRPr sz="1200"/>
+            </a:lvl1pPr>
+          </a:lstStyle>
+          <a:p>
+            <a:fld id="{8BEEF123-EF69-4130-B167-B2B188BE0A9F}" type="datetimeFigureOut">
+              <a:rPr lang="es-EC" smtClean="0"/>
+              <a:t>3/9/2025</a:t>
+            </a:fld>
+            <a:endParaRPr lang="es-EC"/>
+          </a:p>
+        </p:txBody>
+      </p:sp>
+      <p:sp>
+        <p:nvSpPr>
+          <p:cNvPr id="4" name="Marcador de imagen de diapositiva 3"/>
+          <p:cNvSpPr>
+            <a:spLocks noGrp="1" noRot="1" noChangeAspect="1"/>
+          </p:cNvSpPr>
+          <p:nvPr>
+            <p:ph type="sldImg" idx="2"/>
+          </p:nvPr>
+        </p:nvSpPr>
+        <p:spPr>
+          <a:xfrm>
+            <a:off x="685800" y="1143000"/>
+            <a:ext cx="5486400" cy="3086100"/>
+          </a:xfrm>
+          <a:prstGeom prst="rect">
+            <a:avLst/>
+          </a:prstGeom>
+          <a:noFill/>
+          <a:ln w="12700">
+            <a:solidFill>
+              <a:prstClr val="black"/>
+            </a:solidFill>
+          </a:ln>
+        </p:spPr>
+        <p:txBody>
+          <a:bodyPr vert="horz" lIns="91440" tIns="45720" rIns="91440" bIns="45720" rtlCol="0" anchor="ctr"/>
+          <a:lstStyle/>
+          <a:p>
+            <a:endParaRPr lang="es-EC"/>
+          </a:p>
+        </p:txBody>
+      </p:sp>
+      <p:sp>
+        <p:nvSpPr>
+          <p:cNvPr id="5" name="Marcador de notas 4"/>
+          <p:cNvSpPr>
+            <a:spLocks noGrp="1"/>
+          </p:cNvSpPr>
+          <p:nvPr>
+            <p:ph type="body" sz="quarter" idx="3"/>
+          </p:nvPr>
+        </p:nvSpPr>
+        <p:spPr>
+          <a:xfrm>
+            <a:off x="685800" y="4400550"/>
+            <a:ext cx="5486400" cy="3600450"/>
+          </a:xfrm>
+          <a:prstGeom prst="rect">
+            <a:avLst/>
+          </a:prstGeom>
+        </p:spPr>
+        <p:txBody>
+          <a:bodyPr vert="horz" lIns="91440" tIns="45720" rIns="91440" bIns="45720" rtlCol="0"/>
+          <a:lstStyle/>
+          <a:p>
+            <a:pPr lvl="0"/>
+            <a:r>
+              <a:rPr lang="es-ES"/>
+              <a:t>Haga clic para modificar los estilos de texto del patrón</a:t>
+            </a:r>
+          </a:p>
+          <a:p>
+            <a:pPr lvl="1"/>
+            <a:r>
+              <a:rPr lang="es-ES"/>
+              <a:t>Segundo nivel</a:t>
+            </a:r>
+          </a:p>
+          <a:p>
+            <a:pPr lvl="2"/>
+            <a:r>
+              <a:rPr lang="es-ES"/>
+              <a:t>Tercer nivel</a:t>
+            </a:r>
+          </a:p>
+          <a:p>
+            <a:pPr lvl="3"/>
+            <a:r>
+              <a:rPr lang="es-ES"/>
+              <a:t>Cuarto nivel</a:t>
+            </a:r>
+          </a:p>
+          <a:p>
+            <a:pPr lvl="4"/>
+            <a:r>
+              <a:rPr lang="es-ES"/>
+              <a:t>Quinto nivel</a:t>
+            </a:r>
+            <a:endParaRPr lang="es-EC"/>
+          </a:p>
+        </p:txBody>
+      </p:sp>
+      <p:sp>
+        <p:nvSpPr>
+          <p:cNvPr id="6" name="Marcador de pie de página 5"/>
+          <p:cNvSpPr>
+            <a:spLocks noGrp="1"/>
+          </p:cNvSpPr>
+          <p:nvPr>
+            <p:ph type="ftr" sz="quarter" idx="4"/>
+          </p:nvPr>
+        </p:nvSpPr>
+        <p:spPr>
+          <a:xfrm>
+            <a:off x="0" y="8685213"/>
+            <a:ext cx="2971800" cy="458787"/>
+          </a:xfrm>
+          <a:prstGeom prst="rect">
+            <a:avLst/>
+          </a:prstGeom>
+        </p:spPr>
+        <p:txBody>
+          <a:bodyPr vert="horz" lIns="91440" tIns="45720" rIns="91440" bIns="45720" rtlCol="0" anchor="b"/>
+          <a:lstStyle>
+            <a:lvl1pPr algn="l">
+              <a:defRPr sz="1200"/>
+            </a:lvl1pPr>
+          </a:lstStyle>
+          <a:p>
+            <a:endParaRPr lang="es-EC"/>
+          </a:p>
+        </p:txBody>
+      </p:sp>
+      <p:sp>
+        <p:nvSpPr>
+          <p:cNvPr id="7" name="Marcador de número de diapositiva 6"/>
+          <p:cNvSpPr>
+            <a:spLocks noGrp="1"/>
+          </p:cNvSpPr>
+          <p:nvPr>
+            <p:ph type="sldNum" sz="quarter" idx="5"/>
+          </p:nvPr>
+        </p:nvSpPr>
+        <p:spPr>
+          <a:xfrm>
+            <a:off x="3884613" y="8685213"/>
+            <a:ext cx="2971800" cy="458787"/>
+          </a:xfrm>
+          <a:prstGeom prst="rect">
+            <a:avLst/>
+          </a:prstGeom>
+        </p:spPr>
+        <p:txBody>
+          <a:bodyPr vert="horz" lIns="91440" tIns="45720" rIns="91440" bIns="45720" rtlCol="0" anchor="b"/>
+          <a:lstStyle>
+            <a:lvl1pPr algn="r">
+              <a:defRPr sz="1200"/>
+            </a:lvl1pPr>
+          </a:lstStyle>
+          <a:p>
+            <a:fld id="{0F887841-6D70-4983-99F3-87BE3288BCBC}" type="slidenum">
+              <a:rPr lang="es-EC" smtClean="0"/>
+              <a:t>‹Nº›</a:t>
+            </a:fld>
+            <a:endParaRPr lang="es-EC"/>
+          </a:p>
+        </p:txBody>
+      </p:sp>
+    </p:spTree>
+    <p:extLst>
+      <p:ext uri="{BB962C8B-B14F-4D97-AF65-F5344CB8AC3E}">
+        <p14:creationId xmlns:p14="http://schemas.microsoft.com/office/powerpoint/2010/main" val="3081470284"/>
+      </p:ext>
+    </p:extLst>
+  </p:cSld>
+  <p:clrMap bg1="lt1" tx1="dk1" bg2="lt2" tx2="dk2" accent1="accent1" accent2="accent2" accent3="accent3" accent4="accent4" accent5="accent5" accent6="accent6" hlink="hlink" folHlink="folHlink"/>
+  <p:notesStyle>
+    <a:lvl1pPr marL="0" algn="l" defTabSz="914400" rtl="0" eaLnBrk="1" latinLnBrk="0" hangingPunct="1">
+      <a:defRPr sz="1200" kern="1200">
+        <a:solidFill>
+          <a:schemeClr val="tx1"/>
+        </a:solidFill>
+        <a:latin typeface="+mn-lt"/>
+        <a:ea typeface="+mn-ea"/>
+        <a:cs typeface="+mn-cs"/>
+      </a:defRPr>
+    </a:lvl1pPr>
+    <a:lvl2pPr marL="457200" algn="l" defTabSz="914400" rtl="0" eaLnBrk="1" latinLnBrk="0" hangingPunct="1">
+      <a:defRPr sz="1200" kern="1200">
+        <a:solidFill>
+          <a:schemeClr val="tx1"/>
+        </a:solidFill>
+        <a:latin typeface="+mn-lt"/>
+        <a:ea typeface="+mn-ea"/>
+        <a:cs typeface="+mn-cs"/>
+      </a:defRPr>
+    </a:lvl2pPr>
+    <a:lvl3pPr marL="914400" algn="l" defTabSz="914400" rtl="0" eaLnBrk="1" latinLnBrk="0" hangingPunct="1">
+      <a:defRPr sz="1200" kern="1200">
+        <a:solidFill>
+          <a:schemeClr val="tx1"/>
+        </a:solidFill>
+        <a:latin typeface="+mn-lt"/>
+        <a:ea typeface="+mn-ea"/>
+        <a:cs typeface="+mn-cs"/>
+      </a:defRPr>
+    </a:lvl3pPr>
+    <a:lvl4pPr marL="1371600" algn="l" defTabSz="914400" rtl="0" eaLnBrk="1" latinLnBrk="0" hangingPunct="1">
+      <a:defRPr sz="1200" kern="1200">
+        <a:solidFill>
+          <a:schemeClr val="tx1"/>
+        </a:solidFill>
+        <a:latin typeface="+mn-lt"/>
+        <a:ea typeface="+mn-ea"/>
+        <a:cs typeface="+mn-cs"/>
+      </a:defRPr>
+    </a:lvl4pPr>
+    <a:lvl5pPr marL="1828800" algn="l" defTabSz="914400" rtl="0" eaLnBrk="1" latinLnBrk="0" hangingPunct="1">
+      <a:defRPr sz="1200" kern="1200">
+        <a:solidFill>
+          <a:schemeClr val="tx1"/>
+        </a:solidFill>
+        <a:latin typeface="+mn-lt"/>
+        <a:ea typeface="+mn-ea"/>
+        <a:cs typeface="+mn-cs"/>
+      </a:defRPr>
+    </a:lvl5pPr>
+    <a:lvl6pPr marL="2286000" algn="l" defTabSz="914400" rtl="0" eaLnBrk="1" latinLnBrk="0" hangingPunct="1">
+      <a:defRPr sz="1200" kern="1200">
+        <a:solidFill>
+          <a:schemeClr val="tx1"/>
+        </a:solidFill>
+        <a:latin typeface="+mn-lt"/>
+        <a:ea typeface="+mn-ea"/>
+        <a:cs typeface="+mn-cs"/>
+      </a:defRPr>
+    </a:lvl6pPr>
+    <a:lvl7pPr marL="2743200" algn="l" defTabSz="914400" rtl="0" eaLnBrk="1" latinLnBrk="0" hangingPunct="1">
+      <a:defRPr sz="1200" kern="1200">
+        <a:solidFill>
+          <a:schemeClr val="tx1"/>
+        </a:solidFill>
+        <a:latin typeface="+mn-lt"/>
+        <a:ea typeface="+mn-ea"/>
+        <a:cs typeface="+mn-cs"/>
+      </a:defRPr>
+    </a:lvl7pPr>
+    <a:lvl8pPr marL="3200400" algn="l" defTabSz="914400" rtl="0" eaLnBrk="1" latinLnBrk="0" hangingPunct="1">
+      <a:defRPr sz="1200" kern="1200">
+        <a:solidFill>
+          <a:schemeClr val="tx1"/>
+        </a:solidFill>
+        <a:latin typeface="+mn-lt"/>
+        <a:ea typeface="+mn-ea"/>
+        <a:cs typeface="+mn-cs"/>
+      </a:defRPr>
+    </a:lvl8pPr>
+    <a:lvl9pPr marL="3657600" algn="l" defTabSz="914400" rtl="0" eaLnBrk="1" latinLnBrk="0" hangingPunct="1">
+      <a:defRPr sz="1200" kern="1200">
+        <a:solidFill>
+          <a:schemeClr val="tx1"/>
+        </a:solidFill>
+        <a:latin typeface="+mn-lt"/>
+        <a:ea typeface="+mn-ea"/>
+        <a:cs typeface="+mn-cs"/>
+      </a:defRPr>
+    </a:lvl9pPr>
+  </p:notesStyle>
+</p:notesMaster>
+</file>
+
+<file path=ppt/notesSlides/notesSlide1.xml><?xml version="1.0" encoding="utf-8"?>
+<p:notes xmlns:a="http://schemas.openxmlformats.org/drawingml/2006/main" xmlns:r="http://schemas.openxmlformats.org/officeDocument/2006/relationships" xmlns:p="http://schemas.openxmlformats.org/presentationml/2006/main">
+  <p:cSld>
+    <p:spTree>
+      <p:nvGrpSpPr>
+        <p:cNvPr id="1" name=""/>
+        <p:cNvGrpSpPr/>
+        <p:nvPr/>
+      </p:nvGrpSpPr>
+      <p:grpSpPr>
+        <a:xfrm>
+          <a:off x="0" y="0"/>
+          <a:ext cx="0" cy="0"/>
+          <a:chOff x="0" y="0"/>
+          <a:chExt cx="0" cy="0"/>
+        </a:xfrm>
+      </p:grpSpPr>
+      <p:sp>
+        <p:nvSpPr>
+          <p:cNvPr id="2" name="Marcador de imagen de diapositiva 1"/>
+          <p:cNvSpPr>
+            <a:spLocks noGrp="1" noRot="1" noChangeAspect="1"/>
+          </p:cNvSpPr>
+          <p:nvPr>
+            <p:ph type="sldImg"/>
+          </p:nvPr>
+        </p:nvSpPr>
+        <p:spPr/>
+      </p:sp>
+      <p:sp>
+        <p:nvSpPr>
+          <p:cNvPr id="3" name="Marcador de notas 2"/>
+          <p:cNvSpPr>
+            <a:spLocks noGrp="1"/>
+          </p:cNvSpPr>
+          <p:nvPr>
+            <p:ph type="body" idx="1"/>
+          </p:nvPr>
+        </p:nvSpPr>
+        <p:spPr/>
+        <p:txBody>
+          <a:bodyPr/>
+          <a:lstStyle/>
+          <a:p>
+            <a:endParaRPr lang="es-EC" dirty="0"/>
+          </a:p>
+        </p:txBody>
+      </p:sp>
+      <p:sp>
+        <p:nvSpPr>
+          <p:cNvPr id="4" name="Marcador de número de diapositiva 3"/>
+          <p:cNvSpPr>
+            <a:spLocks noGrp="1"/>
+          </p:cNvSpPr>
+          <p:nvPr>
+            <p:ph type="sldNum" sz="quarter" idx="5"/>
+          </p:nvPr>
+        </p:nvSpPr>
+        <p:spPr/>
+        <p:txBody>
+          <a:bodyPr/>
+          <a:lstStyle/>
+          <a:p>
+            <a:fld id="{0F887841-6D70-4983-99F3-87BE3288BCBC}" type="slidenum">
+              <a:rPr lang="es-EC" smtClean="0"/>
+              <a:t>2</a:t>
+            </a:fld>
+            <a:endParaRPr lang="es-EC"/>
+          </a:p>
+        </p:txBody>
+      </p:sp>
+    </p:spTree>
+    <p:extLst>
+      <p:ext uri="{BB962C8B-B14F-4D97-AF65-F5344CB8AC3E}">
+        <p14:creationId xmlns:p14="http://schemas.microsoft.com/office/powerpoint/2010/main" val="774616598"/>
+      </p:ext>
+    </p:extLst>
+  </p:cSld>
+  <p:clrMapOvr>
+    <a:masterClrMapping/>
+  </p:clrMapOvr>
+</p:notes>
 </file>
 
 <file path=ppt/slideLayouts/slideLayout1.xml><?xml version="1.0" encoding="utf-8"?>
@@ -3856,7 +4301,7 @@
           <a:p>
             <a:r>
               <a:rPr lang="es-ES" dirty="0"/>
-              <a:t>REPASO, CAPITULO 1</a:t>
+              <a:t>CAPITULO 1, repaso</a:t>
             </a:r>
             <a:endParaRPr lang="es-EC" dirty="0"/>
           </a:p>
@@ -3872,10 +4317,3640 @@
   <p:clrMapOvr>
     <a:masterClrMapping/>
   </p:clrMapOvr>
+  <mc:AlternateContent xmlns:mc="http://schemas.openxmlformats.org/markup-compatibility/2006">
+    <mc:Choice xmlns:p14="http://schemas.microsoft.com/office/powerpoint/2010/main" Requires="p14">
+      <p:transition spd="slow" p14:dur="3400">
+        <p14:reveal/>
+      </p:transition>
+    </mc:Choice>
+    <mc:Fallback>
+      <p:transition spd="slow">
+        <p:fade/>
+      </p:transition>
+    </mc:Fallback>
+  </mc:AlternateContent>
 </p:sld>
 </file>
 
 <file path=ppt/slides/slide2.xml><?xml version="1.0" encoding="utf-8"?>
+<p:sld xmlns:a="http://schemas.openxmlformats.org/drawingml/2006/main" xmlns:r="http://schemas.openxmlformats.org/officeDocument/2006/relationships" xmlns:p="http://schemas.openxmlformats.org/presentationml/2006/main">
+  <p:cSld>
+    <p:bg>
+      <p:bgPr>
+        <a:solidFill>
+          <a:schemeClr val="bg2"/>
+        </a:solidFill>
+        <a:effectLst/>
+      </p:bgPr>
+    </p:bg>
+    <p:spTree>
+      <p:nvGrpSpPr>
+        <p:cNvPr id="1" name=""/>
+        <p:cNvGrpSpPr/>
+        <p:nvPr/>
+      </p:nvGrpSpPr>
+      <p:grpSpPr>
+        <a:xfrm>
+          <a:off x="0" y="0"/>
+          <a:ext cx="0" cy="0"/>
+          <a:chOff x="0" y="0"/>
+          <a:chExt cx="0" cy="0"/>
+        </a:xfrm>
+      </p:grpSpPr>
+      <p:sp useBgFill="1">
+        <p:nvSpPr>
+          <p:cNvPr id="18" name="Rectangle 9">
+            <a:extLst>
+              <a:ext uri="{FF2B5EF4-FFF2-40B4-BE49-F238E27FC236}">
+                <a16:creationId xmlns:a16="http://schemas.microsoft.com/office/drawing/2014/main" id="{27A23741-C8CC-49EF-950D-A0B72BACD691}"/>
+              </a:ext>
+              <a:ext uri="{C183D7F6-B498-43B3-948B-1728B52AA6E4}">
+                <adec:decorative xmlns:adec="http://schemas.microsoft.com/office/drawing/2017/decorative" val="1"/>
+              </a:ext>
+            </a:extLst>
+          </p:cNvPr>
+          <p:cNvSpPr>
+            <a:spLocks noGrp="1" noRot="1" noChangeAspect="1" noMove="1" noResize="1" noEditPoints="1" noAdjustHandles="1" noChangeArrowheads="1" noChangeShapeType="1" noTextEdit="1"/>
+          </p:cNvSpPr>
+          <p:nvPr>
+            <p:extLst>
+              <p:ext uri="{386F3935-93C4-4BCD-93E2-E3B085C9AB24}">
+                <p16:designElem xmlns:p16="http://schemas.microsoft.com/office/powerpoint/2015/main" val="1"/>
+              </p:ext>
+            </p:extLst>
+          </p:nvPr>
+        </p:nvSpPr>
+        <p:spPr>
+          <a:xfrm>
+            <a:off x="0" y="0"/>
+            <a:ext cx="12186315" cy="6858000"/>
+          </a:xfrm>
+          <a:prstGeom prst="rect">
+            <a:avLst/>
+          </a:prstGeom>
+          <a:ln>
+            <a:noFill/>
+          </a:ln>
+        </p:spPr>
+        <p:style>
+          <a:lnRef idx="2">
+            <a:schemeClr val="accent6">
+              <a:shade val="50000"/>
+            </a:schemeClr>
+          </a:lnRef>
+          <a:fillRef idx="1001">
+            <a:schemeClr val="lt1"/>
+          </a:fillRef>
+          <a:effectRef idx="0">
+            <a:schemeClr val="accent6"/>
+          </a:effectRef>
+          <a:fontRef idx="minor">
+            <a:schemeClr val="lt1"/>
+          </a:fontRef>
+        </p:style>
+        <p:txBody>
+          <a:bodyPr rtlCol="0" anchor="ctr"/>
+          <a:lstStyle/>
+          <a:p>
+            <a:pPr algn="ctr"/>
+            <a:endParaRPr lang="en-US"/>
+          </a:p>
+        </p:txBody>
+      </p:sp>
+      <p:sp>
+        <p:nvSpPr>
+          <p:cNvPr id="19" name="Rectangle 11">
+            <a:extLst>
+              <a:ext uri="{FF2B5EF4-FFF2-40B4-BE49-F238E27FC236}">
+                <a16:creationId xmlns:a16="http://schemas.microsoft.com/office/drawing/2014/main" id="{04E823DD-C233-455F-9FF9-40C20F5D1691}"/>
+              </a:ext>
+              <a:ext uri="{C183D7F6-B498-43B3-948B-1728B52AA6E4}">
+                <adec:decorative xmlns:adec="http://schemas.microsoft.com/office/drawing/2017/decorative" val="1"/>
+              </a:ext>
+            </a:extLst>
+          </p:cNvPr>
+          <p:cNvSpPr>
+            <a:spLocks noGrp="1" noRot="1" noChangeAspect="1" noMove="1" noResize="1" noEditPoints="1" noAdjustHandles="1" noChangeArrowheads="1" noChangeShapeType="1" noTextEdit="1"/>
+          </p:cNvSpPr>
+          <p:nvPr>
+            <p:extLst>
+              <p:ext uri="{386F3935-93C4-4BCD-93E2-E3B085C9AB24}">
+                <p16:designElem xmlns:p16="http://schemas.microsoft.com/office/powerpoint/2015/main" val="1"/>
+              </p:ext>
+            </p:extLst>
+          </p:nvPr>
+        </p:nvSpPr>
+        <p:spPr>
+          <a:xfrm>
+            <a:off x="16" y="0"/>
+            <a:ext cx="4050791" cy="6858000"/>
+          </a:xfrm>
+          <a:prstGeom prst="rect">
+            <a:avLst/>
+          </a:prstGeom>
+          <a:solidFill>
+            <a:schemeClr val="accent4">
+              <a:lumMod val="75000"/>
+            </a:schemeClr>
+          </a:solidFill>
+          <a:ln>
+            <a:noFill/>
+          </a:ln>
+        </p:spPr>
+        <p:style>
+          <a:lnRef idx="2">
+            <a:schemeClr val="accent1">
+              <a:shade val="50000"/>
+            </a:schemeClr>
+          </a:lnRef>
+          <a:fillRef idx="1">
+            <a:schemeClr val="accent1"/>
+          </a:fillRef>
+          <a:effectRef idx="0">
+            <a:schemeClr val="accent1"/>
+          </a:effectRef>
+          <a:fontRef idx="minor">
+            <a:schemeClr val="lt1"/>
+          </a:fontRef>
+        </p:style>
+        <p:txBody>
+          <a:bodyPr/>
+          <a:lstStyle/>
+          <a:p>
+            <a:endParaRPr lang="es-EC"/>
+          </a:p>
+        </p:txBody>
+      </p:sp>
+      <p:sp>
+        <p:nvSpPr>
+          <p:cNvPr id="2" name="Título 1">
+            <a:extLst>
+              <a:ext uri="{FF2B5EF4-FFF2-40B4-BE49-F238E27FC236}">
+                <a16:creationId xmlns:a16="http://schemas.microsoft.com/office/drawing/2014/main" id="{77FC902F-0F03-C645-BFBC-C5944312F120}"/>
+              </a:ext>
+            </a:extLst>
+          </p:cNvPr>
+          <p:cNvSpPr>
+            <a:spLocks noGrp="1"/>
+          </p:cNvSpPr>
+          <p:nvPr>
+            <p:ph type="title"/>
+          </p:nvPr>
+        </p:nvSpPr>
+        <p:spPr>
+          <a:xfrm>
+            <a:off x="492370" y="516835"/>
+            <a:ext cx="3084844" cy="2103875"/>
+          </a:xfrm>
+        </p:spPr>
+        <p:txBody>
+          <a:bodyPr>
+            <a:normAutofit/>
+          </a:bodyPr>
+          <a:lstStyle/>
+          <a:p>
+            <a:r>
+              <a:rPr lang="es-ES" sz="6000" b="1" dirty="0">
+                <a:solidFill>
+                  <a:srgbClr val="FFFFFF"/>
+                </a:solidFill>
+              </a:rPr>
+              <a:t>Etiqueta &lt;div&gt;</a:t>
+            </a:r>
+            <a:endParaRPr lang="es-EC" sz="6000" b="1" dirty="0">
+              <a:solidFill>
+                <a:srgbClr val="FFFFFF"/>
+              </a:solidFill>
+            </a:endParaRPr>
+          </a:p>
+        </p:txBody>
+      </p:sp>
+      <p:sp>
+        <p:nvSpPr>
+          <p:cNvPr id="3" name="Marcador de contenido 2">
+            <a:extLst>
+              <a:ext uri="{FF2B5EF4-FFF2-40B4-BE49-F238E27FC236}">
+                <a16:creationId xmlns:a16="http://schemas.microsoft.com/office/drawing/2014/main" id="{2C5E67F1-C968-B8D1-0A2E-7BE8B7FAD9B0}"/>
+              </a:ext>
+            </a:extLst>
+          </p:cNvPr>
+          <p:cNvSpPr>
+            <a:spLocks noGrp="1"/>
+          </p:cNvSpPr>
+          <p:nvPr>
+            <p:ph idx="1"/>
+          </p:nvPr>
+        </p:nvSpPr>
+        <p:spPr>
+          <a:xfrm>
+            <a:off x="297712" y="2653800"/>
+            <a:ext cx="3434315" cy="3335519"/>
+          </a:xfrm>
+        </p:spPr>
+        <p:txBody>
+          <a:bodyPr>
+            <a:normAutofit/>
+          </a:bodyPr>
+          <a:lstStyle/>
+          <a:p>
+            <a:r>
+              <a:rPr lang="es-ES" sz="2800" dirty="0">
+                <a:solidFill>
+                  <a:srgbClr val="FFFFFF"/>
+                </a:solidFill>
+              </a:rPr>
+              <a:t>Una etiqueta div es una etiqueta que </a:t>
+            </a:r>
+            <a:r>
+              <a:rPr lang="es-ES" sz="2800" dirty="0">
+                <a:solidFill>
+                  <a:schemeClr val="tx1"/>
+                </a:solidFill>
+                <a:highlight>
+                  <a:srgbClr val="00FF00"/>
+                </a:highlight>
+              </a:rPr>
+              <a:t>define las divisiones lógicas </a:t>
+            </a:r>
+            <a:r>
+              <a:rPr lang="es-ES" sz="2800" dirty="0">
+                <a:solidFill>
+                  <a:srgbClr val="FFFFFF"/>
+                </a:solidFill>
+              </a:rPr>
+              <a:t>existentes en el contenido de una página web.</a:t>
+            </a:r>
+            <a:endParaRPr lang="es-EC" sz="2800" dirty="0">
+              <a:solidFill>
+                <a:srgbClr val="FFFFFF"/>
+              </a:solidFill>
+            </a:endParaRPr>
+          </a:p>
+        </p:txBody>
+      </p:sp>
+      <p:sp>
+        <p:nvSpPr>
+          <p:cNvPr id="20" name="Rectangle 13">
+            <a:extLst>
+              <a:ext uri="{FF2B5EF4-FFF2-40B4-BE49-F238E27FC236}">
+                <a16:creationId xmlns:a16="http://schemas.microsoft.com/office/drawing/2014/main" id="{83CF00AF-6C1D-4FC6-89F3-121ED766ABE1}"/>
+              </a:ext>
+              <a:ext uri="{C183D7F6-B498-43B3-948B-1728B52AA6E4}">
+                <adec:decorative xmlns:adec="http://schemas.microsoft.com/office/drawing/2017/decorative" val="1"/>
+              </a:ext>
+            </a:extLst>
+          </p:cNvPr>
+          <p:cNvSpPr>
+            <a:spLocks noGrp="1" noRot="1" noChangeAspect="1" noMove="1" noResize="1" noEditPoints="1" noAdjustHandles="1" noChangeArrowheads="1" noChangeShapeType="1" noTextEdit="1"/>
+          </p:cNvSpPr>
+          <p:nvPr>
+            <p:extLst>
+              <p:ext uri="{386F3935-93C4-4BCD-93E2-E3B085C9AB24}">
+                <p16:designElem xmlns:p16="http://schemas.microsoft.com/office/powerpoint/2015/main" val="1"/>
+              </p:ext>
+            </p:extLst>
+          </p:nvPr>
+        </p:nvSpPr>
+        <p:spPr>
+          <a:xfrm>
+            <a:off x="4040071" y="0"/>
+            <a:ext cx="64008" cy="6858000"/>
+          </a:xfrm>
+          <a:prstGeom prst="rect">
+            <a:avLst/>
+          </a:prstGeom>
+          <a:solidFill>
+            <a:schemeClr val="accent4"/>
+          </a:solidFill>
+          <a:ln>
+            <a:noFill/>
+          </a:ln>
+        </p:spPr>
+        <p:style>
+          <a:lnRef idx="2">
+            <a:schemeClr val="accent1">
+              <a:shade val="50000"/>
+            </a:schemeClr>
+          </a:lnRef>
+          <a:fillRef idx="1">
+            <a:schemeClr val="accent1"/>
+          </a:fillRef>
+          <a:effectRef idx="0">
+            <a:schemeClr val="accent1"/>
+          </a:effectRef>
+          <a:fontRef idx="minor">
+            <a:schemeClr val="lt1"/>
+          </a:fontRef>
+        </p:style>
+        <p:txBody>
+          <a:bodyPr/>
+          <a:lstStyle/>
+          <a:p>
+            <a:endParaRPr lang="es-EC"/>
+          </a:p>
+        </p:txBody>
+      </p:sp>
+      <p:sp>
+        <p:nvSpPr>
+          <p:cNvPr id="8" name="CuadroTexto 7">
+            <a:extLst>
+              <a:ext uri="{FF2B5EF4-FFF2-40B4-BE49-F238E27FC236}">
+                <a16:creationId xmlns:a16="http://schemas.microsoft.com/office/drawing/2014/main" id="{399EDA00-35D1-E2DF-464C-6C9D5EF7289F}"/>
+              </a:ext>
+            </a:extLst>
+          </p:cNvPr>
+          <p:cNvSpPr txBox="1"/>
+          <p:nvPr/>
+        </p:nvSpPr>
+        <p:spPr>
+          <a:xfrm>
+            <a:off x="1910374" y="222350"/>
+            <a:ext cx="2371861" cy="646331"/>
+          </a:xfrm>
+          <a:prstGeom prst="rect">
+            <a:avLst/>
+          </a:prstGeom>
+        </p:spPr>
+        <p:style>
+          <a:lnRef idx="3">
+            <a:schemeClr val="lt1"/>
+          </a:lnRef>
+          <a:fillRef idx="1">
+            <a:schemeClr val="accent6"/>
+          </a:fillRef>
+          <a:effectRef idx="1">
+            <a:schemeClr val="accent6"/>
+          </a:effectRef>
+          <a:fontRef idx="minor">
+            <a:schemeClr val="lt1"/>
+          </a:fontRef>
+        </p:style>
+        <p:txBody>
+          <a:bodyPr wrap="square" rtlCol="0">
+            <a:spAutoFit/>
+          </a:bodyPr>
+          <a:lstStyle/>
+          <a:p>
+            <a:r>
+              <a:rPr lang="es-ES" dirty="0"/>
+              <a:t>En el primer div, tenemos un párrafo</a:t>
+            </a:r>
+            <a:endParaRPr lang="es-EC" dirty="0"/>
+          </a:p>
+        </p:txBody>
+      </p:sp>
+      <p:sp>
+        <p:nvSpPr>
+          <p:cNvPr id="13" name="CuadroTexto 12">
+            <a:extLst>
+              <a:ext uri="{FF2B5EF4-FFF2-40B4-BE49-F238E27FC236}">
+                <a16:creationId xmlns:a16="http://schemas.microsoft.com/office/drawing/2014/main" id="{D005021D-D6B5-5F74-05DA-379DE1B85B79}"/>
+              </a:ext>
+            </a:extLst>
+          </p:cNvPr>
+          <p:cNvSpPr txBox="1"/>
+          <p:nvPr/>
+        </p:nvSpPr>
+        <p:spPr>
+          <a:xfrm>
+            <a:off x="1223730" y="5933610"/>
+            <a:ext cx="2371861" cy="646331"/>
+          </a:xfrm>
+          <a:prstGeom prst="rect">
+            <a:avLst/>
+          </a:prstGeom>
+        </p:spPr>
+        <p:style>
+          <a:lnRef idx="3">
+            <a:schemeClr val="lt1"/>
+          </a:lnRef>
+          <a:fillRef idx="1">
+            <a:schemeClr val="accent6"/>
+          </a:fillRef>
+          <a:effectRef idx="1">
+            <a:schemeClr val="accent6"/>
+          </a:effectRef>
+          <a:fontRef idx="minor">
+            <a:schemeClr val="lt1"/>
+          </a:fontRef>
+        </p:style>
+        <p:txBody>
+          <a:bodyPr wrap="square" rtlCol="0">
+            <a:spAutoFit/>
+          </a:bodyPr>
+          <a:lstStyle/>
+          <a:p>
+            <a:r>
+              <a:rPr lang="es-ES" dirty="0"/>
+              <a:t>En el segundo div, tenemos una imagen</a:t>
+            </a:r>
+            <a:endParaRPr lang="es-EC" dirty="0"/>
+          </a:p>
+        </p:txBody>
+      </p:sp>
+      <p:pic>
+        <p:nvPicPr>
+          <p:cNvPr id="25" name="Imagen 24">
+            <a:extLst>
+              <a:ext uri="{FF2B5EF4-FFF2-40B4-BE49-F238E27FC236}">
+                <a16:creationId xmlns:a16="http://schemas.microsoft.com/office/drawing/2014/main" id="{12372C76-8E98-D4B9-807A-D993141899B5}"/>
+              </a:ext>
+            </a:extLst>
+          </p:cNvPr>
+          <p:cNvPicPr>
+            <a:picLocks noChangeAspect="1"/>
+          </p:cNvPicPr>
+          <p:nvPr/>
+        </p:nvPicPr>
+        <p:blipFill>
+          <a:blip r:embed="rId3"/>
+          <a:srcRect r="29211"/>
+          <a:stretch>
+            <a:fillRect/>
+          </a:stretch>
+        </p:blipFill>
+        <p:spPr>
+          <a:xfrm>
+            <a:off x="4574262" y="1297861"/>
+            <a:ext cx="7407957" cy="4831354"/>
+          </a:xfrm>
+          <a:prstGeom prst="rect">
+            <a:avLst/>
+          </a:prstGeom>
+        </p:spPr>
+      </p:pic>
+      <p:sp>
+        <p:nvSpPr>
+          <p:cNvPr id="6" name="Abrir llave 5">
+            <a:extLst>
+              <a:ext uri="{FF2B5EF4-FFF2-40B4-BE49-F238E27FC236}">
+                <a16:creationId xmlns:a16="http://schemas.microsoft.com/office/drawing/2014/main" id="{9D4F455F-AC06-C6B3-CA17-5CF87B512F99}"/>
+              </a:ext>
+            </a:extLst>
+          </p:cNvPr>
+          <p:cNvSpPr/>
+          <p:nvPr/>
+        </p:nvSpPr>
+        <p:spPr>
+          <a:xfrm>
+            <a:off x="4657274" y="1568772"/>
+            <a:ext cx="467619" cy="2036135"/>
+          </a:xfrm>
+          <a:prstGeom prst="leftBrace">
+            <a:avLst>
+              <a:gd name="adj1" fmla="val 76016"/>
+              <a:gd name="adj2" fmla="val 51567"/>
+            </a:avLst>
+          </a:prstGeom>
+          <a:noFill/>
+          <a:ln>
+            <a:solidFill>
+              <a:srgbClr val="FF0000"/>
+            </a:solidFill>
+          </a:ln>
+        </p:spPr>
+        <p:style>
+          <a:lnRef idx="3">
+            <a:schemeClr val="accent1"/>
+          </a:lnRef>
+          <a:fillRef idx="0">
+            <a:schemeClr val="accent1"/>
+          </a:fillRef>
+          <a:effectRef idx="2">
+            <a:schemeClr val="accent1"/>
+          </a:effectRef>
+          <a:fontRef idx="minor">
+            <a:schemeClr val="tx1"/>
+          </a:fontRef>
+        </p:style>
+        <p:txBody>
+          <a:bodyPr rtlCol="0" anchor="ctr"/>
+          <a:lstStyle/>
+          <a:p>
+            <a:pPr algn="ctr"/>
+            <a:endParaRPr lang="es-EC"/>
+          </a:p>
+        </p:txBody>
+      </p:sp>
+      <p:sp>
+        <p:nvSpPr>
+          <p:cNvPr id="7" name="Abrir llave 6">
+            <a:extLst>
+              <a:ext uri="{FF2B5EF4-FFF2-40B4-BE49-F238E27FC236}">
+                <a16:creationId xmlns:a16="http://schemas.microsoft.com/office/drawing/2014/main" id="{A9BDBE20-7E8C-803D-C81B-9E3E2B9F1EE6}"/>
+              </a:ext>
+            </a:extLst>
+          </p:cNvPr>
+          <p:cNvSpPr/>
+          <p:nvPr/>
+        </p:nvSpPr>
+        <p:spPr>
+          <a:xfrm>
+            <a:off x="4566935" y="3826008"/>
+            <a:ext cx="467619" cy="1904941"/>
+          </a:xfrm>
+          <a:prstGeom prst="leftBrace">
+            <a:avLst>
+              <a:gd name="adj1" fmla="val 76016"/>
+              <a:gd name="adj2" fmla="val 51567"/>
+            </a:avLst>
+          </a:prstGeom>
+          <a:noFill/>
+          <a:ln>
+            <a:solidFill>
+              <a:srgbClr val="FF0000"/>
+            </a:solidFill>
+          </a:ln>
+        </p:spPr>
+        <p:style>
+          <a:lnRef idx="3">
+            <a:schemeClr val="accent1"/>
+          </a:lnRef>
+          <a:fillRef idx="0">
+            <a:schemeClr val="accent1"/>
+          </a:fillRef>
+          <a:effectRef idx="2">
+            <a:schemeClr val="accent1"/>
+          </a:effectRef>
+          <a:fontRef idx="minor">
+            <a:schemeClr val="tx1"/>
+          </a:fontRef>
+        </p:style>
+        <p:txBody>
+          <a:bodyPr rtlCol="0" anchor="ctr"/>
+          <a:lstStyle/>
+          <a:p>
+            <a:pPr algn="ctr"/>
+            <a:endParaRPr lang="es-EC"/>
+          </a:p>
+        </p:txBody>
+      </p:sp>
+      <p:cxnSp>
+        <p:nvCxnSpPr>
+          <p:cNvPr id="11" name="Conector recto de flecha 10">
+            <a:extLst>
+              <a:ext uri="{FF2B5EF4-FFF2-40B4-BE49-F238E27FC236}">
+                <a16:creationId xmlns:a16="http://schemas.microsoft.com/office/drawing/2014/main" id="{05FDE902-96A6-B728-EC08-38FDF8F0A707}"/>
+              </a:ext>
+            </a:extLst>
+          </p:cNvPr>
+          <p:cNvCxnSpPr>
+            <a:stCxn id="8" idx="2"/>
+            <a:endCxn id="6" idx="1"/>
+          </p:cNvCxnSpPr>
+          <p:nvPr/>
+        </p:nvCxnSpPr>
+        <p:spPr>
+          <a:xfrm>
+            <a:off x="3096305" y="868681"/>
+            <a:ext cx="1560969" cy="1750065"/>
+          </a:xfrm>
+          <a:prstGeom prst="straightConnector1">
+            <a:avLst/>
+          </a:prstGeom>
+          <a:ln>
+            <a:solidFill>
+              <a:srgbClr val="FF0000"/>
+            </a:solidFill>
+            <a:tailEnd type="triangle"/>
+          </a:ln>
+        </p:spPr>
+        <p:style>
+          <a:lnRef idx="3">
+            <a:schemeClr val="dk1"/>
+          </a:lnRef>
+          <a:fillRef idx="0">
+            <a:schemeClr val="dk1"/>
+          </a:fillRef>
+          <a:effectRef idx="2">
+            <a:schemeClr val="dk1"/>
+          </a:effectRef>
+          <a:fontRef idx="minor">
+            <a:schemeClr val="tx1"/>
+          </a:fontRef>
+        </p:style>
+      </p:cxnSp>
+      <p:cxnSp>
+        <p:nvCxnSpPr>
+          <p:cNvPr id="17" name="Conector recto 16">
+            <a:extLst>
+              <a:ext uri="{FF2B5EF4-FFF2-40B4-BE49-F238E27FC236}">
+                <a16:creationId xmlns:a16="http://schemas.microsoft.com/office/drawing/2014/main" id="{47F69AFD-A66B-4239-0FDB-762CBFAA6F4F}"/>
+              </a:ext>
+            </a:extLst>
+          </p:cNvPr>
+          <p:cNvCxnSpPr>
+            <a:stCxn id="13" idx="0"/>
+            <a:endCxn id="7" idx="1"/>
+          </p:cNvCxnSpPr>
+          <p:nvPr/>
+        </p:nvCxnSpPr>
+        <p:spPr>
+          <a:xfrm flipV="1">
+            <a:off x="2409661" y="4808329"/>
+            <a:ext cx="2157274" cy="1125281"/>
+          </a:xfrm>
+          <a:prstGeom prst="line">
+            <a:avLst/>
+          </a:prstGeom>
+          <a:ln>
+            <a:solidFill>
+              <a:srgbClr val="FF0000"/>
+            </a:solidFill>
+          </a:ln>
+        </p:spPr>
+        <p:style>
+          <a:lnRef idx="3">
+            <a:schemeClr val="dk1"/>
+          </a:lnRef>
+          <a:fillRef idx="0">
+            <a:schemeClr val="dk1"/>
+          </a:fillRef>
+          <a:effectRef idx="2">
+            <a:schemeClr val="dk1"/>
+          </a:effectRef>
+          <a:fontRef idx="minor">
+            <a:schemeClr val="tx1"/>
+          </a:fontRef>
+        </p:style>
+      </p:cxnSp>
+    </p:spTree>
+    <p:extLst>
+      <p:ext uri="{BB962C8B-B14F-4D97-AF65-F5344CB8AC3E}">
+        <p14:creationId xmlns:p14="http://schemas.microsoft.com/office/powerpoint/2010/main" val="1654506962"/>
+      </p:ext>
+    </p:extLst>
+  </p:cSld>
+  <p:clrMapOvr>
+    <a:masterClrMapping/>
+  </p:clrMapOvr>
+  <p:transition spd="slow">
+    <p:push dir="u"/>
+  </p:transition>
+  <p:timing>
+    <p:tnLst>
+      <p:par>
+        <p:cTn id="1" dur="indefinite" restart="never" nodeType="tmRoot">
+          <p:childTnLst>
+            <p:seq concurrent="1" nextAc="seek">
+              <p:cTn id="2" dur="indefinite" nodeType="mainSeq">
+                <p:childTnLst>
+                  <p:par>
+                    <p:cTn id="3" fill="hold">
+                      <p:stCondLst>
+                        <p:cond delay="indefinite"/>
+                      </p:stCondLst>
+                      <p:childTnLst>
+                        <p:par>
+                          <p:cTn id="4" fill="hold">
+                            <p:stCondLst>
+                              <p:cond delay="0"/>
+                            </p:stCondLst>
+                            <p:childTnLst>
+                              <p:par>
+                                <p:cTn id="5" presetID="42" presetClass="entr" presetSubtype="0" fill="hold" grpId="0" nodeType="clickEffect">
+                                  <p:stCondLst>
+                                    <p:cond delay="0"/>
+                                  </p:stCondLst>
+                                  <p:childTnLst>
+                                    <p:set>
+                                      <p:cBhvr>
+                                        <p:cTn id="6" dur="1" fill="hold">
+                                          <p:stCondLst>
+                                            <p:cond delay="0"/>
+                                          </p:stCondLst>
+                                        </p:cTn>
+                                        <p:tgtEl>
+                                          <p:spTgt spid="7"/>
+                                        </p:tgtEl>
+                                        <p:attrNameLst>
+                                          <p:attrName>style.visibility</p:attrName>
+                                        </p:attrNameLst>
+                                      </p:cBhvr>
+                                      <p:to>
+                                        <p:strVal val="visible"/>
+                                      </p:to>
+                                    </p:set>
+                                    <p:animEffect transition="in" filter="fade">
+                                      <p:cBhvr>
+                                        <p:cTn id="7" dur="1000"/>
+                                        <p:tgtEl>
+                                          <p:spTgt spid="7"/>
+                                        </p:tgtEl>
+                                      </p:cBhvr>
+                                    </p:animEffect>
+                                    <p:anim calcmode="lin" valueType="num">
+                                      <p:cBhvr>
+                                        <p:cTn id="8" dur="1000" fill="hold"/>
+                                        <p:tgtEl>
+                                          <p:spTgt spid="7"/>
+                                        </p:tgtEl>
+                                        <p:attrNameLst>
+                                          <p:attrName>ppt_x</p:attrName>
+                                        </p:attrNameLst>
+                                      </p:cBhvr>
+                                      <p:tavLst>
+                                        <p:tav tm="0">
+                                          <p:val>
+                                            <p:strVal val="#ppt_x"/>
+                                          </p:val>
+                                        </p:tav>
+                                        <p:tav tm="100000">
+                                          <p:val>
+                                            <p:strVal val="#ppt_x"/>
+                                          </p:val>
+                                        </p:tav>
+                                      </p:tavLst>
+                                    </p:anim>
+                                    <p:anim calcmode="lin" valueType="num">
+                                      <p:cBhvr>
+                                        <p:cTn id="9" dur="1000" fill="hold"/>
+                                        <p:tgtEl>
+                                          <p:spTgt spid="7"/>
+                                        </p:tgtEl>
+                                        <p:attrNameLst>
+                                          <p:attrName>ppt_y</p:attrName>
+                                        </p:attrNameLst>
+                                      </p:cBhvr>
+                                      <p:tavLst>
+                                        <p:tav tm="0">
+                                          <p:val>
+                                            <p:strVal val="#ppt_y+.1"/>
+                                          </p:val>
+                                        </p:tav>
+                                        <p:tav tm="100000">
+                                          <p:val>
+                                            <p:strVal val="#ppt_y"/>
+                                          </p:val>
+                                        </p:tav>
+                                      </p:tavLst>
+                                    </p:anim>
+                                  </p:childTnLst>
+                                </p:cTn>
+                              </p:par>
+                              <p:par>
+                                <p:cTn id="10" presetID="42" presetClass="entr" presetSubtype="0" fill="hold" grpId="0" nodeType="withEffect">
+                                  <p:stCondLst>
+                                    <p:cond delay="0"/>
+                                  </p:stCondLst>
+                                  <p:childTnLst>
+                                    <p:set>
+                                      <p:cBhvr>
+                                        <p:cTn id="11" dur="1" fill="hold">
+                                          <p:stCondLst>
+                                            <p:cond delay="0"/>
+                                          </p:stCondLst>
+                                        </p:cTn>
+                                        <p:tgtEl>
+                                          <p:spTgt spid="6"/>
+                                        </p:tgtEl>
+                                        <p:attrNameLst>
+                                          <p:attrName>style.visibility</p:attrName>
+                                        </p:attrNameLst>
+                                      </p:cBhvr>
+                                      <p:to>
+                                        <p:strVal val="visible"/>
+                                      </p:to>
+                                    </p:set>
+                                    <p:animEffect transition="in" filter="fade">
+                                      <p:cBhvr>
+                                        <p:cTn id="12" dur="1000"/>
+                                        <p:tgtEl>
+                                          <p:spTgt spid="6"/>
+                                        </p:tgtEl>
+                                      </p:cBhvr>
+                                    </p:animEffect>
+                                    <p:anim calcmode="lin" valueType="num">
+                                      <p:cBhvr>
+                                        <p:cTn id="13" dur="1000" fill="hold"/>
+                                        <p:tgtEl>
+                                          <p:spTgt spid="6"/>
+                                        </p:tgtEl>
+                                        <p:attrNameLst>
+                                          <p:attrName>ppt_x</p:attrName>
+                                        </p:attrNameLst>
+                                      </p:cBhvr>
+                                      <p:tavLst>
+                                        <p:tav tm="0">
+                                          <p:val>
+                                            <p:strVal val="#ppt_x"/>
+                                          </p:val>
+                                        </p:tav>
+                                        <p:tav tm="100000">
+                                          <p:val>
+                                            <p:strVal val="#ppt_x"/>
+                                          </p:val>
+                                        </p:tav>
+                                      </p:tavLst>
+                                    </p:anim>
+                                    <p:anim calcmode="lin" valueType="num">
+                                      <p:cBhvr>
+                                        <p:cTn id="14" dur="1000" fill="hold"/>
+                                        <p:tgtEl>
+                                          <p:spTgt spid="6"/>
+                                        </p:tgtEl>
+                                        <p:attrNameLst>
+                                          <p:attrName>ppt_y</p:attrName>
+                                        </p:attrNameLst>
+                                      </p:cBhvr>
+                                      <p:tavLst>
+                                        <p:tav tm="0">
+                                          <p:val>
+                                            <p:strVal val="#ppt_y+.1"/>
+                                          </p:val>
+                                        </p:tav>
+                                        <p:tav tm="100000">
+                                          <p:val>
+                                            <p:strVal val="#ppt_y"/>
+                                          </p:val>
+                                        </p:tav>
+                                      </p:tavLst>
+                                    </p:anim>
+                                  </p:childTnLst>
+                                </p:cTn>
+                              </p:par>
+                            </p:childTnLst>
+                          </p:cTn>
+                        </p:par>
+                      </p:childTnLst>
+                    </p:cTn>
+                  </p:par>
+                  <p:par>
+                    <p:cTn id="15" fill="hold">
+                      <p:stCondLst>
+                        <p:cond delay="indefinite"/>
+                      </p:stCondLst>
+                      <p:childTnLst>
+                        <p:par>
+                          <p:cTn id="16" fill="hold">
+                            <p:stCondLst>
+                              <p:cond delay="0"/>
+                            </p:stCondLst>
+                            <p:childTnLst>
+                              <p:par>
+                                <p:cTn id="17" presetID="47" presetClass="entr" presetSubtype="0" fill="hold" nodeType="clickEffect">
+                                  <p:stCondLst>
+                                    <p:cond delay="0"/>
+                                  </p:stCondLst>
+                                  <p:childTnLst>
+                                    <p:set>
+                                      <p:cBhvr>
+                                        <p:cTn id="18" dur="1" fill="hold">
+                                          <p:stCondLst>
+                                            <p:cond delay="0"/>
+                                          </p:stCondLst>
+                                        </p:cTn>
+                                        <p:tgtEl>
+                                          <p:spTgt spid="11"/>
+                                        </p:tgtEl>
+                                        <p:attrNameLst>
+                                          <p:attrName>style.visibility</p:attrName>
+                                        </p:attrNameLst>
+                                      </p:cBhvr>
+                                      <p:to>
+                                        <p:strVal val="visible"/>
+                                      </p:to>
+                                    </p:set>
+                                    <p:animEffect transition="in" filter="fade">
+                                      <p:cBhvr>
+                                        <p:cTn id="19" dur="1000"/>
+                                        <p:tgtEl>
+                                          <p:spTgt spid="11"/>
+                                        </p:tgtEl>
+                                      </p:cBhvr>
+                                    </p:animEffect>
+                                    <p:anim calcmode="lin" valueType="num">
+                                      <p:cBhvr>
+                                        <p:cTn id="20" dur="1000" fill="hold"/>
+                                        <p:tgtEl>
+                                          <p:spTgt spid="11"/>
+                                        </p:tgtEl>
+                                        <p:attrNameLst>
+                                          <p:attrName>ppt_x</p:attrName>
+                                        </p:attrNameLst>
+                                      </p:cBhvr>
+                                      <p:tavLst>
+                                        <p:tav tm="0">
+                                          <p:val>
+                                            <p:strVal val="#ppt_x"/>
+                                          </p:val>
+                                        </p:tav>
+                                        <p:tav tm="100000">
+                                          <p:val>
+                                            <p:strVal val="#ppt_x"/>
+                                          </p:val>
+                                        </p:tav>
+                                      </p:tavLst>
+                                    </p:anim>
+                                    <p:anim calcmode="lin" valueType="num">
+                                      <p:cBhvr>
+                                        <p:cTn id="21" dur="1000" fill="hold"/>
+                                        <p:tgtEl>
+                                          <p:spTgt spid="11"/>
+                                        </p:tgtEl>
+                                        <p:attrNameLst>
+                                          <p:attrName>ppt_y</p:attrName>
+                                        </p:attrNameLst>
+                                      </p:cBhvr>
+                                      <p:tavLst>
+                                        <p:tav tm="0">
+                                          <p:val>
+                                            <p:strVal val="#ppt_y-.1"/>
+                                          </p:val>
+                                        </p:tav>
+                                        <p:tav tm="100000">
+                                          <p:val>
+                                            <p:strVal val="#ppt_y"/>
+                                          </p:val>
+                                        </p:tav>
+                                      </p:tavLst>
+                                    </p:anim>
+                                  </p:childTnLst>
+                                </p:cTn>
+                              </p:par>
+                              <p:par>
+                                <p:cTn id="22" presetID="47" presetClass="entr" presetSubtype="0" fill="hold" grpId="0" nodeType="withEffect">
+                                  <p:stCondLst>
+                                    <p:cond delay="0"/>
+                                  </p:stCondLst>
+                                  <p:childTnLst>
+                                    <p:set>
+                                      <p:cBhvr>
+                                        <p:cTn id="23" dur="1" fill="hold">
+                                          <p:stCondLst>
+                                            <p:cond delay="0"/>
+                                          </p:stCondLst>
+                                        </p:cTn>
+                                        <p:tgtEl>
+                                          <p:spTgt spid="8"/>
+                                        </p:tgtEl>
+                                        <p:attrNameLst>
+                                          <p:attrName>style.visibility</p:attrName>
+                                        </p:attrNameLst>
+                                      </p:cBhvr>
+                                      <p:to>
+                                        <p:strVal val="visible"/>
+                                      </p:to>
+                                    </p:set>
+                                    <p:animEffect transition="in" filter="fade">
+                                      <p:cBhvr>
+                                        <p:cTn id="24" dur="1000"/>
+                                        <p:tgtEl>
+                                          <p:spTgt spid="8"/>
+                                        </p:tgtEl>
+                                      </p:cBhvr>
+                                    </p:animEffect>
+                                    <p:anim calcmode="lin" valueType="num">
+                                      <p:cBhvr>
+                                        <p:cTn id="25" dur="1000" fill="hold"/>
+                                        <p:tgtEl>
+                                          <p:spTgt spid="8"/>
+                                        </p:tgtEl>
+                                        <p:attrNameLst>
+                                          <p:attrName>ppt_x</p:attrName>
+                                        </p:attrNameLst>
+                                      </p:cBhvr>
+                                      <p:tavLst>
+                                        <p:tav tm="0">
+                                          <p:val>
+                                            <p:strVal val="#ppt_x"/>
+                                          </p:val>
+                                        </p:tav>
+                                        <p:tav tm="100000">
+                                          <p:val>
+                                            <p:strVal val="#ppt_x"/>
+                                          </p:val>
+                                        </p:tav>
+                                      </p:tavLst>
+                                    </p:anim>
+                                    <p:anim calcmode="lin" valueType="num">
+                                      <p:cBhvr>
+                                        <p:cTn id="26" dur="1000" fill="hold"/>
+                                        <p:tgtEl>
+                                          <p:spTgt spid="8"/>
+                                        </p:tgtEl>
+                                        <p:attrNameLst>
+                                          <p:attrName>ppt_y</p:attrName>
+                                        </p:attrNameLst>
+                                      </p:cBhvr>
+                                      <p:tavLst>
+                                        <p:tav tm="0">
+                                          <p:val>
+                                            <p:strVal val="#ppt_y-.1"/>
+                                          </p:val>
+                                        </p:tav>
+                                        <p:tav tm="100000">
+                                          <p:val>
+                                            <p:strVal val="#ppt_y"/>
+                                          </p:val>
+                                        </p:tav>
+                                      </p:tavLst>
+                                    </p:anim>
+                                  </p:childTnLst>
+                                </p:cTn>
+                              </p:par>
+                              <p:par>
+                                <p:cTn id="27" presetID="47" presetClass="entr" presetSubtype="0" fill="hold" nodeType="withEffect">
+                                  <p:stCondLst>
+                                    <p:cond delay="0"/>
+                                  </p:stCondLst>
+                                  <p:childTnLst>
+                                    <p:set>
+                                      <p:cBhvr>
+                                        <p:cTn id="28" dur="1" fill="hold">
+                                          <p:stCondLst>
+                                            <p:cond delay="0"/>
+                                          </p:stCondLst>
+                                        </p:cTn>
+                                        <p:tgtEl>
+                                          <p:spTgt spid="17"/>
+                                        </p:tgtEl>
+                                        <p:attrNameLst>
+                                          <p:attrName>style.visibility</p:attrName>
+                                        </p:attrNameLst>
+                                      </p:cBhvr>
+                                      <p:to>
+                                        <p:strVal val="visible"/>
+                                      </p:to>
+                                    </p:set>
+                                    <p:animEffect transition="in" filter="fade">
+                                      <p:cBhvr>
+                                        <p:cTn id="29" dur="1000"/>
+                                        <p:tgtEl>
+                                          <p:spTgt spid="17"/>
+                                        </p:tgtEl>
+                                      </p:cBhvr>
+                                    </p:animEffect>
+                                    <p:anim calcmode="lin" valueType="num">
+                                      <p:cBhvr>
+                                        <p:cTn id="30" dur="1000" fill="hold"/>
+                                        <p:tgtEl>
+                                          <p:spTgt spid="17"/>
+                                        </p:tgtEl>
+                                        <p:attrNameLst>
+                                          <p:attrName>ppt_x</p:attrName>
+                                        </p:attrNameLst>
+                                      </p:cBhvr>
+                                      <p:tavLst>
+                                        <p:tav tm="0">
+                                          <p:val>
+                                            <p:strVal val="#ppt_x"/>
+                                          </p:val>
+                                        </p:tav>
+                                        <p:tav tm="100000">
+                                          <p:val>
+                                            <p:strVal val="#ppt_x"/>
+                                          </p:val>
+                                        </p:tav>
+                                      </p:tavLst>
+                                    </p:anim>
+                                    <p:anim calcmode="lin" valueType="num">
+                                      <p:cBhvr>
+                                        <p:cTn id="31" dur="1000" fill="hold"/>
+                                        <p:tgtEl>
+                                          <p:spTgt spid="17"/>
+                                        </p:tgtEl>
+                                        <p:attrNameLst>
+                                          <p:attrName>ppt_y</p:attrName>
+                                        </p:attrNameLst>
+                                      </p:cBhvr>
+                                      <p:tavLst>
+                                        <p:tav tm="0">
+                                          <p:val>
+                                            <p:strVal val="#ppt_y-.1"/>
+                                          </p:val>
+                                        </p:tav>
+                                        <p:tav tm="100000">
+                                          <p:val>
+                                            <p:strVal val="#ppt_y"/>
+                                          </p:val>
+                                        </p:tav>
+                                      </p:tavLst>
+                                    </p:anim>
+                                  </p:childTnLst>
+                                </p:cTn>
+                              </p:par>
+                              <p:par>
+                                <p:cTn id="32" presetID="47" presetClass="entr" presetSubtype="0" fill="hold" grpId="0" nodeType="withEffect">
+                                  <p:stCondLst>
+                                    <p:cond delay="0"/>
+                                  </p:stCondLst>
+                                  <p:childTnLst>
+                                    <p:set>
+                                      <p:cBhvr>
+                                        <p:cTn id="33" dur="1" fill="hold">
+                                          <p:stCondLst>
+                                            <p:cond delay="0"/>
+                                          </p:stCondLst>
+                                        </p:cTn>
+                                        <p:tgtEl>
+                                          <p:spTgt spid="13"/>
+                                        </p:tgtEl>
+                                        <p:attrNameLst>
+                                          <p:attrName>style.visibility</p:attrName>
+                                        </p:attrNameLst>
+                                      </p:cBhvr>
+                                      <p:to>
+                                        <p:strVal val="visible"/>
+                                      </p:to>
+                                    </p:set>
+                                    <p:animEffect transition="in" filter="fade">
+                                      <p:cBhvr>
+                                        <p:cTn id="34" dur="1000"/>
+                                        <p:tgtEl>
+                                          <p:spTgt spid="13"/>
+                                        </p:tgtEl>
+                                      </p:cBhvr>
+                                    </p:animEffect>
+                                    <p:anim calcmode="lin" valueType="num">
+                                      <p:cBhvr>
+                                        <p:cTn id="35" dur="1000" fill="hold"/>
+                                        <p:tgtEl>
+                                          <p:spTgt spid="13"/>
+                                        </p:tgtEl>
+                                        <p:attrNameLst>
+                                          <p:attrName>ppt_x</p:attrName>
+                                        </p:attrNameLst>
+                                      </p:cBhvr>
+                                      <p:tavLst>
+                                        <p:tav tm="0">
+                                          <p:val>
+                                            <p:strVal val="#ppt_x"/>
+                                          </p:val>
+                                        </p:tav>
+                                        <p:tav tm="100000">
+                                          <p:val>
+                                            <p:strVal val="#ppt_x"/>
+                                          </p:val>
+                                        </p:tav>
+                                      </p:tavLst>
+                                    </p:anim>
+                                    <p:anim calcmode="lin" valueType="num">
+                                      <p:cBhvr>
+                                        <p:cTn id="36" dur="1000" fill="hold"/>
+                                        <p:tgtEl>
+                                          <p:spTgt spid="13"/>
+                                        </p:tgtEl>
+                                        <p:attrNameLst>
+                                          <p:attrName>ppt_y</p:attrName>
+                                        </p:attrNameLst>
+                                      </p:cBhvr>
+                                      <p:tavLst>
+                                        <p:tav tm="0">
+                                          <p:val>
+                                            <p:strVal val="#ppt_y-.1"/>
+                                          </p:val>
+                                        </p:tav>
+                                        <p:tav tm="100000">
+                                          <p:val>
+                                            <p:strVal val="#ppt_y"/>
+                                          </p:val>
+                                        </p:tav>
+                                      </p:tavLst>
+                                    </p:anim>
+                                  </p:childTnLst>
+                                </p:cTn>
+                              </p:par>
+                            </p:childTnLst>
+                          </p:cTn>
+                        </p:par>
+                      </p:childTnLst>
+                    </p:cTn>
+                  </p:par>
+                </p:childTnLst>
+              </p:cTn>
+              <p:prevCondLst>
+                <p:cond evt="onPrev" delay="0">
+                  <p:tgtEl>
+                    <p:sldTgt/>
+                  </p:tgtEl>
+                </p:cond>
+              </p:prevCondLst>
+              <p:nextCondLst>
+                <p:cond evt="onNext" delay="0">
+                  <p:tgtEl>
+                    <p:sldTgt/>
+                  </p:tgtEl>
+                </p:cond>
+              </p:nextCondLst>
+            </p:seq>
+          </p:childTnLst>
+        </p:cTn>
+      </p:par>
+    </p:tnLst>
+    <p:bldLst>
+      <p:bldP spid="8" grpId="0" animBg="1"/>
+      <p:bldP spid="13" grpId="0" animBg="1"/>
+      <p:bldP spid="6" grpId="0" animBg="1"/>
+      <p:bldP spid="7" grpId="0" animBg="1"/>
+    </p:bldLst>
+  </p:timing>
+</p:sld>
+</file>
+
+<file path=ppt/slides/slide3.xml><?xml version="1.0" encoding="utf-8"?>
+<p:sld xmlns:a="http://schemas.openxmlformats.org/drawingml/2006/main" xmlns:r="http://schemas.openxmlformats.org/officeDocument/2006/relationships" xmlns:p="http://schemas.openxmlformats.org/presentationml/2006/main">
+  <p:cSld>
+    <p:spTree>
+      <p:nvGrpSpPr>
+        <p:cNvPr id="1" name=""/>
+        <p:cNvGrpSpPr/>
+        <p:nvPr/>
+      </p:nvGrpSpPr>
+      <p:grpSpPr>
+        <a:xfrm>
+          <a:off x="0" y="0"/>
+          <a:ext cx="0" cy="0"/>
+          <a:chOff x="0" y="0"/>
+          <a:chExt cx="0" cy="0"/>
+        </a:xfrm>
+      </p:grpSpPr>
+      <p:sp>
+        <p:nvSpPr>
+          <p:cNvPr id="2" name="Título 1">
+            <a:extLst>
+              <a:ext uri="{FF2B5EF4-FFF2-40B4-BE49-F238E27FC236}">
+                <a16:creationId xmlns:a16="http://schemas.microsoft.com/office/drawing/2014/main" id="{D541EFAB-51A5-F030-9A33-07DD359AF51C}"/>
+              </a:ext>
+            </a:extLst>
+          </p:cNvPr>
+          <p:cNvSpPr>
+            <a:spLocks noGrp="1"/>
+          </p:cNvSpPr>
+          <p:nvPr>
+            <p:ph type="title"/>
+          </p:nvPr>
+        </p:nvSpPr>
+        <p:spPr/>
+        <p:txBody>
+          <a:bodyPr/>
+          <a:lstStyle/>
+          <a:p>
+            <a:r>
+              <a:rPr lang="es-ES" dirty="0"/>
+              <a:t>RESULTADO</a:t>
+            </a:r>
+            <a:endParaRPr lang="es-EC" dirty="0"/>
+          </a:p>
+        </p:txBody>
+      </p:sp>
+      <p:pic>
+        <p:nvPicPr>
+          <p:cNvPr id="5" name="Imagen 4">
+            <a:extLst>
+              <a:ext uri="{FF2B5EF4-FFF2-40B4-BE49-F238E27FC236}">
+                <a16:creationId xmlns:a16="http://schemas.microsoft.com/office/drawing/2014/main" id="{F612FC4B-9439-9015-30C3-276D21538BAD}"/>
+              </a:ext>
+            </a:extLst>
+          </p:cNvPr>
+          <p:cNvPicPr>
+            <a:picLocks noChangeAspect="1"/>
+          </p:cNvPicPr>
+          <p:nvPr/>
+        </p:nvPicPr>
+        <p:blipFill>
+          <a:blip r:embed="rId2"/>
+          <a:stretch>
+            <a:fillRect/>
+          </a:stretch>
+        </p:blipFill>
+        <p:spPr>
+          <a:xfrm>
+            <a:off x="672656" y="1925427"/>
+            <a:ext cx="10907647" cy="4001058"/>
+          </a:xfrm>
+          <a:prstGeom prst="rect">
+            <a:avLst/>
+          </a:prstGeom>
+        </p:spPr>
+      </p:pic>
+    </p:spTree>
+    <p:extLst>
+      <p:ext uri="{BB962C8B-B14F-4D97-AF65-F5344CB8AC3E}">
+        <p14:creationId xmlns:p14="http://schemas.microsoft.com/office/powerpoint/2010/main" val="1186905431"/>
+      </p:ext>
+    </p:extLst>
+  </p:cSld>
+  <p:clrMapOvr>
+    <a:masterClrMapping/>
+  </p:clrMapOvr>
+  <p:transition spd="slow">
+    <p:push dir="u"/>
+  </p:transition>
+</p:sld>
+</file>
+
+<file path=ppt/slides/slide4.xml><?xml version="1.0" encoding="utf-8"?>
+<p:sld xmlns:a="http://schemas.openxmlformats.org/drawingml/2006/main" xmlns:r="http://schemas.openxmlformats.org/officeDocument/2006/relationships" xmlns:p="http://schemas.openxmlformats.org/presentationml/2006/main">
+  <p:cSld>
+    <p:spTree>
+      <p:nvGrpSpPr>
+        <p:cNvPr id="1" name=""/>
+        <p:cNvGrpSpPr/>
+        <p:nvPr/>
+      </p:nvGrpSpPr>
+      <p:grpSpPr>
+        <a:xfrm>
+          <a:off x="0" y="0"/>
+          <a:ext cx="0" cy="0"/>
+          <a:chOff x="0" y="0"/>
+          <a:chExt cx="0" cy="0"/>
+        </a:xfrm>
+      </p:grpSpPr>
+      <p:sp>
+        <p:nvSpPr>
+          <p:cNvPr id="2" name="Título 1">
+            <a:extLst>
+              <a:ext uri="{FF2B5EF4-FFF2-40B4-BE49-F238E27FC236}">
+                <a16:creationId xmlns:a16="http://schemas.microsoft.com/office/drawing/2014/main" id="{52697504-F0F4-B858-C058-4B222711B1B0}"/>
+              </a:ext>
+            </a:extLst>
+          </p:cNvPr>
+          <p:cNvSpPr>
+            <a:spLocks noGrp="1"/>
+          </p:cNvSpPr>
+          <p:nvPr>
+            <p:ph type="title"/>
+          </p:nvPr>
+        </p:nvSpPr>
+        <p:spPr/>
+        <p:txBody>
+          <a:bodyPr/>
+          <a:lstStyle/>
+          <a:p>
+            <a:r>
+              <a:rPr lang="es-ES" dirty="0"/>
+              <a:t>Reto 1:</a:t>
+            </a:r>
+            <a:endParaRPr lang="es-EC" dirty="0"/>
+          </a:p>
+        </p:txBody>
+      </p:sp>
+      <p:sp>
+        <p:nvSpPr>
+          <p:cNvPr id="3" name="Marcador de contenido 2">
+            <a:extLst>
+              <a:ext uri="{FF2B5EF4-FFF2-40B4-BE49-F238E27FC236}">
+                <a16:creationId xmlns:a16="http://schemas.microsoft.com/office/drawing/2014/main" id="{5A790707-BB5D-69CD-A408-16D5E3E31C3F}"/>
+              </a:ext>
+            </a:extLst>
+          </p:cNvPr>
+          <p:cNvSpPr>
+            <a:spLocks noGrp="1"/>
+          </p:cNvSpPr>
+          <p:nvPr>
+            <p:ph idx="1"/>
+          </p:nvPr>
+        </p:nvSpPr>
+        <p:spPr>
+          <a:xfrm>
+            <a:off x="1097280" y="1865613"/>
+            <a:ext cx="3995531" cy="4023360"/>
+          </a:xfrm>
+        </p:spPr>
+        <p:txBody>
+          <a:bodyPr/>
+          <a:lstStyle/>
+          <a:p>
+            <a:pPr marL="0" indent="0">
+              <a:buNone/>
+            </a:pPr>
+            <a:r>
+              <a:rPr lang="es-ES" sz="2400" dirty="0"/>
+              <a:t>Crear 2 section, y que cada section tenga:</a:t>
+            </a:r>
+          </a:p>
+          <a:p>
+            <a:pPr>
+              <a:buFont typeface="Wingdings" panose="05000000000000000000" pitchFamily="2" charset="2"/>
+              <a:buChar char="§"/>
+            </a:pPr>
+            <a:r>
+              <a:rPr lang="es-ES" dirty="0"/>
+              <a:t>Div con un concepto (minimo de 3 líneas y máximo 5), y otro div con una imagen.</a:t>
+            </a:r>
+          </a:p>
+          <a:p>
+            <a:pPr>
+              <a:buFont typeface="Wingdings" panose="05000000000000000000" pitchFamily="2" charset="2"/>
+              <a:buChar char="§"/>
+            </a:pPr>
+            <a:r>
+              <a:rPr lang="es-ES" dirty="0"/>
+              <a:t>Y el otro div una imagen en representación del contexto.</a:t>
+            </a:r>
+          </a:p>
+          <a:p>
+            <a:pPr>
+              <a:buFont typeface="Wingdings" panose="05000000000000000000" pitchFamily="2" charset="2"/>
+              <a:buChar char="§"/>
+            </a:pPr>
+            <a:endParaRPr lang="es-ES" dirty="0"/>
+          </a:p>
+          <a:p>
+            <a:pPr marL="0" indent="0">
+              <a:buNone/>
+            </a:pPr>
+            <a:endParaRPr lang="es-ES" dirty="0"/>
+          </a:p>
+        </p:txBody>
+      </p:sp>
+      <p:sp>
+        <p:nvSpPr>
+          <p:cNvPr id="4" name="Rectángulo: esquinas redondeadas 3">
+            <a:extLst>
+              <a:ext uri="{FF2B5EF4-FFF2-40B4-BE49-F238E27FC236}">
+                <a16:creationId xmlns:a16="http://schemas.microsoft.com/office/drawing/2014/main" id="{3A9024C7-6F44-1359-5A24-12420FDDC03E}"/>
+              </a:ext>
+            </a:extLst>
+          </p:cNvPr>
+          <p:cNvSpPr/>
+          <p:nvPr/>
+        </p:nvSpPr>
+        <p:spPr>
+          <a:xfrm>
+            <a:off x="5804452" y="770320"/>
+            <a:ext cx="5078895" cy="5118653"/>
+          </a:xfrm>
+          <a:prstGeom prst="roundRect">
+            <a:avLst/>
+          </a:prstGeom>
+        </p:spPr>
+        <p:style>
+          <a:lnRef idx="1">
+            <a:schemeClr val="accent3"/>
+          </a:lnRef>
+          <a:fillRef idx="3">
+            <a:schemeClr val="accent3"/>
+          </a:fillRef>
+          <a:effectRef idx="2">
+            <a:schemeClr val="accent3"/>
+          </a:effectRef>
+          <a:fontRef idx="minor">
+            <a:schemeClr val="lt1"/>
+          </a:fontRef>
+        </p:style>
+        <p:txBody>
+          <a:bodyPr rtlCol="0" anchor="ctr"/>
+          <a:lstStyle/>
+          <a:p>
+            <a:pPr algn="ctr"/>
+            <a:endParaRPr lang="es-EC"/>
+          </a:p>
+        </p:txBody>
+      </p:sp>
+      <p:sp>
+        <p:nvSpPr>
+          <p:cNvPr id="5" name="Rectángulo: esquinas redondeadas 4">
+            <a:extLst>
+              <a:ext uri="{FF2B5EF4-FFF2-40B4-BE49-F238E27FC236}">
+                <a16:creationId xmlns:a16="http://schemas.microsoft.com/office/drawing/2014/main" id="{1615BB72-FB9B-E600-6B34-2AA17CFA15E2}"/>
+              </a:ext>
+            </a:extLst>
+          </p:cNvPr>
+          <p:cNvSpPr/>
+          <p:nvPr/>
+        </p:nvSpPr>
+        <p:spPr>
+          <a:xfrm>
+            <a:off x="6480313" y="1053549"/>
+            <a:ext cx="3806687" cy="2196548"/>
+          </a:xfrm>
+          <a:prstGeom prst="roundRect">
+            <a:avLst/>
+          </a:prstGeom>
+          <a:solidFill>
+            <a:schemeClr val="accent4">
+              <a:lumMod val="20000"/>
+              <a:lumOff val="80000"/>
+            </a:schemeClr>
+          </a:solidFill>
+        </p:spPr>
+        <p:style>
+          <a:lnRef idx="2">
+            <a:schemeClr val="accent1">
+              <a:shade val="15000"/>
+            </a:schemeClr>
+          </a:lnRef>
+          <a:fillRef idx="1">
+            <a:schemeClr val="accent1"/>
+          </a:fillRef>
+          <a:effectRef idx="0">
+            <a:schemeClr val="accent1"/>
+          </a:effectRef>
+          <a:fontRef idx="minor">
+            <a:schemeClr val="lt1"/>
+          </a:fontRef>
+        </p:style>
+        <p:txBody>
+          <a:bodyPr rtlCol="0" anchor="ctr"/>
+          <a:lstStyle/>
+          <a:p>
+            <a:pPr algn="ctr"/>
+            <a:endParaRPr lang="es-EC"/>
+          </a:p>
+        </p:txBody>
+      </p:sp>
+      <p:sp>
+        <p:nvSpPr>
+          <p:cNvPr id="6" name="Rectángulo: esquinas redondeadas 5">
+            <a:extLst>
+              <a:ext uri="{FF2B5EF4-FFF2-40B4-BE49-F238E27FC236}">
+                <a16:creationId xmlns:a16="http://schemas.microsoft.com/office/drawing/2014/main" id="{416329CB-2FD6-AACF-9AF5-05ED3635B832}"/>
+              </a:ext>
+            </a:extLst>
+          </p:cNvPr>
+          <p:cNvSpPr/>
+          <p:nvPr/>
+        </p:nvSpPr>
+        <p:spPr>
+          <a:xfrm>
+            <a:off x="6480313" y="3312235"/>
+            <a:ext cx="3806687" cy="2196548"/>
+          </a:xfrm>
+          <a:prstGeom prst="roundRect">
+            <a:avLst/>
+          </a:prstGeom>
+          <a:solidFill>
+            <a:schemeClr val="accent4">
+              <a:lumMod val="20000"/>
+              <a:lumOff val="80000"/>
+            </a:schemeClr>
+          </a:solidFill>
+        </p:spPr>
+        <p:style>
+          <a:lnRef idx="2">
+            <a:schemeClr val="accent1">
+              <a:shade val="15000"/>
+            </a:schemeClr>
+          </a:lnRef>
+          <a:fillRef idx="1">
+            <a:schemeClr val="accent1"/>
+          </a:fillRef>
+          <a:effectRef idx="0">
+            <a:schemeClr val="accent1"/>
+          </a:effectRef>
+          <a:fontRef idx="minor">
+            <a:schemeClr val="lt1"/>
+          </a:fontRef>
+        </p:style>
+        <p:txBody>
+          <a:bodyPr rtlCol="0" anchor="ctr"/>
+          <a:lstStyle/>
+          <a:p>
+            <a:pPr algn="ctr"/>
+            <a:endParaRPr lang="es-EC"/>
+          </a:p>
+        </p:txBody>
+      </p:sp>
+      <p:sp>
+        <p:nvSpPr>
+          <p:cNvPr id="7" name="Rectángulo: esquinas redondeadas 6">
+            <a:extLst>
+              <a:ext uri="{FF2B5EF4-FFF2-40B4-BE49-F238E27FC236}">
+                <a16:creationId xmlns:a16="http://schemas.microsoft.com/office/drawing/2014/main" id="{97BAB213-3B9E-E071-02C5-89275A5AE8EA}"/>
+              </a:ext>
+            </a:extLst>
+          </p:cNvPr>
+          <p:cNvSpPr/>
+          <p:nvPr/>
+        </p:nvSpPr>
+        <p:spPr>
+          <a:xfrm>
+            <a:off x="6778488" y="1799498"/>
+            <a:ext cx="1272208" cy="970577"/>
+          </a:xfrm>
+          <a:prstGeom prst="roundRect">
+            <a:avLst/>
+          </a:prstGeom>
+          <a:solidFill>
+            <a:schemeClr val="accent4">
+              <a:lumMod val="60000"/>
+              <a:lumOff val="40000"/>
+            </a:schemeClr>
+          </a:solidFill>
+        </p:spPr>
+        <p:style>
+          <a:lnRef idx="2">
+            <a:schemeClr val="accent1">
+              <a:shade val="15000"/>
+            </a:schemeClr>
+          </a:lnRef>
+          <a:fillRef idx="1">
+            <a:schemeClr val="accent1"/>
+          </a:fillRef>
+          <a:effectRef idx="0">
+            <a:schemeClr val="accent1"/>
+          </a:effectRef>
+          <a:fontRef idx="minor">
+            <a:schemeClr val="lt1"/>
+          </a:fontRef>
+        </p:style>
+        <p:txBody>
+          <a:bodyPr rtlCol="0" anchor="ctr"/>
+          <a:lstStyle/>
+          <a:p>
+            <a:pPr algn="ctr"/>
+            <a:endParaRPr lang="es-EC"/>
+          </a:p>
+        </p:txBody>
+      </p:sp>
+      <p:sp>
+        <p:nvSpPr>
+          <p:cNvPr id="9" name="Rectángulo: esquinas redondeadas 8">
+            <a:extLst>
+              <a:ext uri="{FF2B5EF4-FFF2-40B4-BE49-F238E27FC236}">
+                <a16:creationId xmlns:a16="http://schemas.microsoft.com/office/drawing/2014/main" id="{05AE7142-FFA5-6E28-52E5-CD43AA05E781}"/>
+              </a:ext>
+            </a:extLst>
+          </p:cNvPr>
+          <p:cNvSpPr/>
+          <p:nvPr/>
+        </p:nvSpPr>
+        <p:spPr>
+          <a:xfrm>
+            <a:off x="8383656" y="1799497"/>
+            <a:ext cx="1272208" cy="970577"/>
+          </a:xfrm>
+          <a:prstGeom prst="roundRect">
+            <a:avLst/>
+          </a:prstGeom>
+          <a:solidFill>
+            <a:schemeClr val="accent4">
+              <a:lumMod val="60000"/>
+              <a:lumOff val="40000"/>
+            </a:schemeClr>
+          </a:solidFill>
+        </p:spPr>
+        <p:style>
+          <a:lnRef idx="2">
+            <a:schemeClr val="accent1">
+              <a:shade val="15000"/>
+            </a:schemeClr>
+          </a:lnRef>
+          <a:fillRef idx="1">
+            <a:schemeClr val="accent1"/>
+          </a:fillRef>
+          <a:effectRef idx="0">
+            <a:schemeClr val="accent1"/>
+          </a:effectRef>
+          <a:fontRef idx="minor">
+            <a:schemeClr val="lt1"/>
+          </a:fontRef>
+        </p:style>
+        <p:txBody>
+          <a:bodyPr rtlCol="0" anchor="ctr"/>
+          <a:lstStyle/>
+          <a:p>
+            <a:pPr algn="ctr"/>
+            <a:endParaRPr lang="es-EC"/>
+          </a:p>
+        </p:txBody>
+      </p:sp>
+      <p:sp>
+        <p:nvSpPr>
+          <p:cNvPr id="10" name="Rectángulo: esquinas redondeadas 9">
+            <a:extLst>
+              <a:ext uri="{FF2B5EF4-FFF2-40B4-BE49-F238E27FC236}">
+                <a16:creationId xmlns:a16="http://schemas.microsoft.com/office/drawing/2014/main" id="{3D2161B6-8773-74A4-2012-DF8D09700183}"/>
+              </a:ext>
+            </a:extLst>
+          </p:cNvPr>
+          <p:cNvSpPr/>
+          <p:nvPr/>
+        </p:nvSpPr>
+        <p:spPr>
+          <a:xfrm>
+            <a:off x="6723822" y="3921400"/>
+            <a:ext cx="1759226" cy="627598"/>
+          </a:xfrm>
+          <a:prstGeom prst="roundRect">
+            <a:avLst/>
+          </a:prstGeom>
+          <a:solidFill>
+            <a:schemeClr val="accent4">
+              <a:lumMod val="40000"/>
+              <a:lumOff val="60000"/>
+            </a:schemeClr>
+          </a:solidFill>
+        </p:spPr>
+        <p:style>
+          <a:lnRef idx="2">
+            <a:schemeClr val="accent1">
+              <a:shade val="15000"/>
+            </a:schemeClr>
+          </a:lnRef>
+          <a:fillRef idx="1">
+            <a:schemeClr val="accent1"/>
+          </a:fillRef>
+          <a:effectRef idx="0">
+            <a:schemeClr val="accent1"/>
+          </a:effectRef>
+          <a:fontRef idx="minor">
+            <a:schemeClr val="lt1"/>
+          </a:fontRef>
+        </p:style>
+        <p:txBody>
+          <a:bodyPr rtlCol="0" anchor="ctr"/>
+          <a:lstStyle/>
+          <a:p>
+            <a:pPr algn="ctr"/>
+            <a:endParaRPr lang="es-EC"/>
+          </a:p>
+        </p:txBody>
+      </p:sp>
+      <p:sp>
+        <p:nvSpPr>
+          <p:cNvPr id="12" name="Rectángulo: esquinas redondeadas 11">
+            <a:extLst>
+              <a:ext uri="{FF2B5EF4-FFF2-40B4-BE49-F238E27FC236}">
+                <a16:creationId xmlns:a16="http://schemas.microsoft.com/office/drawing/2014/main" id="{793F94D1-9ED1-DCE4-59E3-B9CC413B27BE}"/>
+              </a:ext>
+            </a:extLst>
+          </p:cNvPr>
+          <p:cNvSpPr/>
+          <p:nvPr/>
+        </p:nvSpPr>
+        <p:spPr>
+          <a:xfrm>
+            <a:off x="6723822" y="4715091"/>
+            <a:ext cx="1759226" cy="627598"/>
+          </a:xfrm>
+          <a:prstGeom prst="roundRect">
+            <a:avLst/>
+          </a:prstGeom>
+          <a:solidFill>
+            <a:schemeClr val="accent4">
+              <a:lumMod val="40000"/>
+              <a:lumOff val="60000"/>
+            </a:schemeClr>
+          </a:solidFill>
+        </p:spPr>
+        <p:style>
+          <a:lnRef idx="2">
+            <a:schemeClr val="accent1">
+              <a:shade val="15000"/>
+            </a:schemeClr>
+          </a:lnRef>
+          <a:fillRef idx="1">
+            <a:schemeClr val="accent1"/>
+          </a:fillRef>
+          <a:effectRef idx="0">
+            <a:schemeClr val="accent1"/>
+          </a:effectRef>
+          <a:fontRef idx="minor">
+            <a:schemeClr val="lt1"/>
+          </a:fontRef>
+        </p:style>
+        <p:txBody>
+          <a:bodyPr rtlCol="0" anchor="ctr"/>
+          <a:lstStyle/>
+          <a:p>
+            <a:pPr algn="ctr"/>
+            <a:endParaRPr lang="es-EC"/>
+          </a:p>
+        </p:txBody>
+      </p:sp>
+      <p:sp>
+        <p:nvSpPr>
+          <p:cNvPr id="14" name="CuadroTexto 13">
+            <a:extLst>
+              <a:ext uri="{FF2B5EF4-FFF2-40B4-BE49-F238E27FC236}">
+                <a16:creationId xmlns:a16="http://schemas.microsoft.com/office/drawing/2014/main" id="{7A8DC76A-9567-418E-1F3E-37C2A57C2A0E}"/>
+              </a:ext>
+            </a:extLst>
+          </p:cNvPr>
+          <p:cNvSpPr txBox="1"/>
+          <p:nvPr/>
+        </p:nvSpPr>
+        <p:spPr>
+          <a:xfrm>
+            <a:off x="6723822" y="1234958"/>
+            <a:ext cx="1222513" cy="461665"/>
+          </a:xfrm>
+          <a:prstGeom prst="rect">
+            <a:avLst/>
+          </a:prstGeom>
+          <a:noFill/>
+          <a:ln>
+            <a:noFill/>
+          </a:ln>
+        </p:spPr>
+        <p:style>
+          <a:lnRef idx="0">
+            <a:scrgbClr r="0" g="0" b="0"/>
+          </a:lnRef>
+          <a:fillRef idx="0">
+            <a:scrgbClr r="0" g="0" b="0"/>
+          </a:fillRef>
+          <a:effectRef idx="0">
+            <a:scrgbClr r="0" g="0" b="0"/>
+          </a:effectRef>
+          <a:fontRef idx="minor">
+            <a:schemeClr val="dk1"/>
+          </a:fontRef>
+        </p:style>
+        <p:txBody>
+          <a:bodyPr wrap="square" rtlCol="0">
+            <a:spAutoFit/>
+          </a:bodyPr>
+          <a:lstStyle/>
+          <a:p>
+            <a:r>
+              <a:rPr lang="es-ES" sz="2400" dirty="0">
+                <a:solidFill>
+                  <a:srgbClr val="002060"/>
+                </a:solidFill>
+              </a:rPr>
+              <a:t>&lt;div&gt;</a:t>
+            </a:r>
+            <a:endParaRPr lang="es-EC" sz="2400" dirty="0">
+              <a:solidFill>
+                <a:srgbClr val="002060"/>
+              </a:solidFill>
+            </a:endParaRPr>
+          </a:p>
+        </p:txBody>
+      </p:sp>
+      <p:sp>
+        <p:nvSpPr>
+          <p:cNvPr id="15" name="CuadroTexto 14">
+            <a:extLst>
+              <a:ext uri="{FF2B5EF4-FFF2-40B4-BE49-F238E27FC236}">
+                <a16:creationId xmlns:a16="http://schemas.microsoft.com/office/drawing/2014/main" id="{B970C109-B90E-8CB2-CB2E-961B6C384B8A}"/>
+              </a:ext>
+            </a:extLst>
+          </p:cNvPr>
+          <p:cNvSpPr txBox="1"/>
+          <p:nvPr/>
+        </p:nvSpPr>
+        <p:spPr>
+          <a:xfrm>
+            <a:off x="6955901" y="2032063"/>
+            <a:ext cx="917381" cy="461665"/>
+          </a:xfrm>
+          <a:prstGeom prst="rect">
+            <a:avLst/>
+          </a:prstGeom>
+          <a:noFill/>
+          <a:ln>
+            <a:noFill/>
+          </a:ln>
+        </p:spPr>
+        <p:style>
+          <a:lnRef idx="0">
+            <a:scrgbClr r="0" g="0" b="0"/>
+          </a:lnRef>
+          <a:fillRef idx="0">
+            <a:scrgbClr r="0" g="0" b="0"/>
+          </a:fillRef>
+          <a:effectRef idx="0">
+            <a:scrgbClr r="0" g="0" b="0"/>
+          </a:effectRef>
+          <a:fontRef idx="minor">
+            <a:schemeClr val="dk1"/>
+          </a:fontRef>
+        </p:style>
+        <p:txBody>
+          <a:bodyPr wrap="square" rtlCol="0">
+            <a:spAutoFit/>
+          </a:bodyPr>
+          <a:lstStyle/>
+          <a:p>
+            <a:r>
+              <a:rPr lang="es-ES" sz="2400" dirty="0">
+                <a:solidFill>
+                  <a:srgbClr val="002060"/>
+                </a:solidFill>
+              </a:rPr>
+              <a:t>&lt;pre&gt;</a:t>
+            </a:r>
+            <a:endParaRPr lang="es-EC" sz="2400" dirty="0">
+              <a:solidFill>
+                <a:srgbClr val="002060"/>
+              </a:solidFill>
+            </a:endParaRPr>
+          </a:p>
+        </p:txBody>
+      </p:sp>
+      <p:sp>
+        <p:nvSpPr>
+          <p:cNvPr id="17" name="CuadroTexto 16">
+            <a:extLst>
+              <a:ext uri="{FF2B5EF4-FFF2-40B4-BE49-F238E27FC236}">
+                <a16:creationId xmlns:a16="http://schemas.microsoft.com/office/drawing/2014/main" id="{BD2ABDD2-4551-2286-2316-209765F800F9}"/>
+              </a:ext>
+            </a:extLst>
+          </p:cNvPr>
+          <p:cNvSpPr txBox="1"/>
+          <p:nvPr/>
+        </p:nvSpPr>
+        <p:spPr>
+          <a:xfrm>
+            <a:off x="7028954" y="3921400"/>
+            <a:ext cx="917381" cy="461665"/>
+          </a:xfrm>
+          <a:prstGeom prst="rect">
+            <a:avLst/>
+          </a:prstGeom>
+          <a:noFill/>
+          <a:ln>
+            <a:noFill/>
+          </a:ln>
+        </p:spPr>
+        <p:style>
+          <a:lnRef idx="0">
+            <a:scrgbClr r="0" g="0" b="0"/>
+          </a:lnRef>
+          <a:fillRef idx="0">
+            <a:scrgbClr r="0" g="0" b="0"/>
+          </a:fillRef>
+          <a:effectRef idx="0">
+            <a:scrgbClr r="0" g="0" b="0"/>
+          </a:effectRef>
+          <a:fontRef idx="minor">
+            <a:schemeClr val="dk1"/>
+          </a:fontRef>
+        </p:style>
+        <p:txBody>
+          <a:bodyPr wrap="square" rtlCol="0">
+            <a:spAutoFit/>
+          </a:bodyPr>
+          <a:lstStyle/>
+          <a:p>
+            <a:r>
+              <a:rPr lang="es-ES" sz="2400" dirty="0">
+                <a:solidFill>
+                  <a:srgbClr val="002060"/>
+                </a:solidFill>
+              </a:rPr>
+              <a:t>&lt;pre&gt;</a:t>
+            </a:r>
+            <a:endParaRPr lang="es-EC" sz="2400" dirty="0">
+              <a:solidFill>
+                <a:srgbClr val="002060"/>
+              </a:solidFill>
+            </a:endParaRPr>
+          </a:p>
+        </p:txBody>
+      </p:sp>
+      <p:sp>
+        <p:nvSpPr>
+          <p:cNvPr id="18" name="CuadroTexto 17">
+            <a:extLst>
+              <a:ext uri="{FF2B5EF4-FFF2-40B4-BE49-F238E27FC236}">
+                <a16:creationId xmlns:a16="http://schemas.microsoft.com/office/drawing/2014/main" id="{8DD0B600-A375-C5C8-5CEC-9605FA97D173}"/>
+              </a:ext>
+            </a:extLst>
+          </p:cNvPr>
+          <p:cNvSpPr txBox="1"/>
+          <p:nvPr/>
+        </p:nvSpPr>
+        <p:spPr>
+          <a:xfrm>
+            <a:off x="6723822" y="3351501"/>
+            <a:ext cx="1222513" cy="461665"/>
+          </a:xfrm>
+          <a:prstGeom prst="rect">
+            <a:avLst/>
+          </a:prstGeom>
+          <a:noFill/>
+          <a:ln>
+            <a:noFill/>
+          </a:ln>
+        </p:spPr>
+        <p:style>
+          <a:lnRef idx="0">
+            <a:scrgbClr r="0" g="0" b="0"/>
+          </a:lnRef>
+          <a:fillRef idx="0">
+            <a:scrgbClr r="0" g="0" b="0"/>
+          </a:fillRef>
+          <a:effectRef idx="0">
+            <a:scrgbClr r="0" g="0" b="0"/>
+          </a:effectRef>
+          <a:fontRef idx="minor">
+            <a:schemeClr val="dk1"/>
+          </a:fontRef>
+        </p:style>
+        <p:txBody>
+          <a:bodyPr wrap="square" rtlCol="0">
+            <a:spAutoFit/>
+          </a:bodyPr>
+          <a:lstStyle/>
+          <a:p>
+            <a:r>
+              <a:rPr lang="es-ES" sz="2400" dirty="0">
+                <a:solidFill>
+                  <a:srgbClr val="002060"/>
+                </a:solidFill>
+              </a:rPr>
+              <a:t>&lt;div&gt;</a:t>
+            </a:r>
+            <a:endParaRPr lang="es-EC" sz="2400" dirty="0">
+              <a:solidFill>
+                <a:srgbClr val="002060"/>
+              </a:solidFill>
+            </a:endParaRPr>
+          </a:p>
+        </p:txBody>
+      </p:sp>
+      <p:sp>
+        <p:nvSpPr>
+          <p:cNvPr id="19" name="CuadroTexto 18">
+            <a:extLst>
+              <a:ext uri="{FF2B5EF4-FFF2-40B4-BE49-F238E27FC236}">
+                <a16:creationId xmlns:a16="http://schemas.microsoft.com/office/drawing/2014/main" id="{03A6456C-5797-E77D-DA15-6AEF88DBB270}"/>
+              </a:ext>
+            </a:extLst>
+          </p:cNvPr>
+          <p:cNvSpPr txBox="1"/>
+          <p:nvPr/>
+        </p:nvSpPr>
+        <p:spPr>
+          <a:xfrm>
+            <a:off x="7028954" y="4733239"/>
+            <a:ext cx="1222513" cy="461665"/>
+          </a:xfrm>
+          <a:prstGeom prst="rect">
+            <a:avLst/>
+          </a:prstGeom>
+          <a:noFill/>
+          <a:ln>
+            <a:noFill/>
+          </a:ln>
+        </p:spPr>
+        <p:style>
+          <a:lnRef idx="0">
+            <a:scrgbClr r="0" g="0" b="0"/>
+          </a:lnRef>
+          <a:fillRef idx="0">
+            <a:scrgbClr r="0" g="0" b="0"/>
+          </a:fillRef>
+          <a:effectRef idx="0">
+            <a:scrgbClr r="0" g="0" b="0"/>
+          </a:effectRef>
+          <a:fontRef idx="minor">
+            <a:schemeClr val="dk1"/>
+          </a:fontRef>
+        </p:style>
+        <p:txBody>
+          <a:bodyPr wrap="square" rtlCol="0">
+            <a:spAutoFit/>
+          </a:bodyPr>
+          <a:lstStyle/>
+          <a:p>
+            <a:r>
+              <a:rPr lang="es-ES" sz="2400" dirty="0">
+                <a:solidFill>
+                  <a:srgbClr val="002060"/>
+                </a:solidFill>
+              </a:rPr>
+              <a:t>&lt;img&gt;</a:t>
+            </a:r>
+            <a:endParaRPr lang="es-EC" sz="2400" dirty="0">
+              <a:solidFill>
+                <a:srgbClr val="002060"/>
+              </a:solidFill>
+            </a:endParaRPr>
+          </a:p>
+        </p:txBody>
+      </p:sp>
+      <p:sp>
+        <p:nvSpPr>
+          <p:cNvPr id="20" name="CuadroTexto 19">
+            <a:extLst>
+              <a:ext uri="{FF2B5EF4-FFF2-40B4-BE49-F238E27FC236}">
+                <a16:creationId xmlns:a16="http://schemas.microsoft.com/office/drawing/2014/main" id="{04AC2864-1391-F012-B984-190FC6806C2D}"/>
+              </a:ext>
+            </a:extLst>
+          </p:cNvPr>
+          <p:cNvSpPr txBox="1"/>
+          <p:nvPr/>
+        </p:nvSpPr>
+        <p:spPr>
+          <a:xfrm>
+            <a:off x="8551877" y="2063132"/>
+            <a:ext cx="1222513" cy="461665"/>
+          </a:xfrm>
+          <a:prstGeom prst="rect">
+            <a:avLst/>
+          </a:prstGeom>
+          <a:noFill/>
+          <a:ln>
+            <a:noFill/>
+          </a:ln>
+        </p:spPr>
+        <p:style>
+          <a:lnRef idx="0">
+            <a:scrgbClr r="0" g="0" b="0"/>
+          </a:lnRef>
+          <a:fillRef idx="0">
+            <a:scrgbClr r="0" g="0" b="0"/>
+          </a:fillRef>
+          <a:effectRef idx="0">
+            <a:scrgbClr r="0" g="0" b="0"/>
+          </a:effectRef>
+          <a:fontRef idx="minor">
+            <a:schemeClr val="dk1"/>
+          </a:fontRef>
+        </p:style>
+        <p:txBody>
+          <a:bodyPr wrap="square" rtlCol="0">
+            <a:spAutoFit/>
+          </a:bodyPr>
+          <a:lstStyle/>
+          <a:p>
+            <a:r>
+              <a:rPr lang="es-ES" sz="2400" dirty="0">
+                <a:solidFill>
+                  <a:srgbClr val="002060"/>
+                </a:solidFill>
+              </a:rPr>
+              <a:t>&lt;img&gt;</a:t>
+            </a:r>
+            <a:endParaRPr lang="es-EC" sz="2400" dirty="0">
+              <a:solidFill>
+                <a:srgbClr val="002060"/>
+              </a:solidFill>
+            </a:endParaRPr>
+          </a:p>
+        </p:txBody>
+      </p:sp>
+      <p:sp>
+        <p:nvSpPr>
+          <p:cNvPr id="21" name="CuadroTexto 20">
+            <a:extLst>
+              <a:ext uri="{FF2B5EF4-FFF2-40B4-BE49-F238E27FC236}">
+                <a16:creationId xmlns:a16="http://schemas.microsoft.com/office/drawing/2014/main" id="{096FFDB8-5198-BF5F-769C-0219B3477A38}"/>
+              </a:ext>
+            </a:extLst>
+          </p:cNvPr>
+          <p:cNvSpPr txBox="1"/>
+          <p:nvPr/>
+        </p:nvSpPr>
+        <p:spPr>
+          <a:xfrm>
+            <a:off x="6464411" y="425790"/>
+            <a:ext cx="1586285" cy="461665"/>
+          </a:xfrm>
+          <a:prstGeom prst="rect">
+            <a:avLst/>
+          </a:prstGeom>
+          <a:noFill/>
+          <a:ln>
+            <a:noFill/>
+          </a:ln>
+        </p:spPr>
+        <p:style>
+          <a:lnRef idx="0">
+            <a:scrgbClr r="0" g="0" b="0"/>
+          </a:lnRef>
+          <a:fillRef idx="0">
+            <a:scrgbClr r="0" g="0" b="0"/>
+          </a:fillRef>
+          <a:effectRef idx="0">
+            <a:scrgbClr r="0" g="0" b="0"/>
+          </a:effectRef>
+          <a:fontRef idx="minor">
+            <a:schemeClr val="dk1"/>
+          </a:fontRef>
+        </p:style>
+        <p:txBody>
+          <a:bodyPr wrap="square" rtlCol="0">
+            <a:spAutoFit/>
+          </a:bodyPr>
+          <a:lstStyle/>
+          <a:p>
+            <a:r>
+              <a:rPr lang="es-ES" sz="2400" dirty="0">
+                <a:solidFill>
+                  <a:srgbClr val="002060"/>
+                </a:solidFill>
+              </a:rPr>
+              <a:t>&lt;section&gt;</a:t>
+            </a:r>
+            <a:endParaRPr lang="es-EC" sz="2400" dirty="0">
+              <a:solidFill>
+                <a:srgbClr val="002060"/>
+              </a:solidFill>
+            </a:endParaRPr>
+          </a:p>
+        </p:txBody>
+      </p:sp>
+      <p:sp>
+        <p:nvSpPr>
+          <p:cNvPr id="25" name="CuadroTexto 24">
+            <a:extLst>
+              <a:ext uri="{FF2B5EF4-FFF2-40B4-BE49-F238E27FC236}">
+                <a16:creationId xmlns:a16="http://schemas.microsoft.com/office/drawing/2014/main" id="{8FB3BEDB-1124-30E9-5AE3-ACF4DE225C76}"/>
+              </a:ext>
+            </a:extLst>
+          </p:cNvPr>
+          <p:cNvSpPr txBox="1"/>
+          <p:nvPr/>
+        </p:nvSpPr>
+        <p:spPr>
+          <a:xfrm>
+            <a:off x="8531253" y="1165567"/>
+            <a:ext cx="917381" cy="461665"/>
+          </a:xfrm>
+          <a:prstGeom prst="rect">
+            <a:avLst/>
+          </a:prstGeom>
+          <a:noFill/>
+          <a:ln>
+            <a:noFill/>
+          </a:ln>
+        </p:spPr>
+        <p:style>
+          <a:lnRef idx="0">
+            <a:scrgbClr r="0" g="0" b="0"/>
+          </a:lnRef>
+          <a:fillRef idx="0">
+            <a:scrgbClr r="0" g="0" b="0"/>
+          </a:fillRef>
+          <a:effectRef idx="0">
+            <a:scrgbClr r="0" g="0" b="0"/>
+          </a:effectRef>
+          <a:fontRef idx="minor">
+            <a:schemeClr val="dk1"/>
+          </a:fontRef>
+        </p:style>
+        <p:txBody>
+          <a:bodyPr wrap="square" rtlCol="0">
+            <a:spAutoFit/>
+          </a:bodyPr>
+          <a:lstStyle/>
+          <a:p>
+            <a:r>
+              <a:rPr lang="es-ES" sz="2400" dirty="0" err="1">
+                <a:solidFill>
+                  <a:srgbClr val="FF0000"/>
+                </a:solidFill>
+              </a:rPr>
+              <a:t>row</a:t>
+            </a:r>
+            <a:endParaRPr lang="es-EC" sz="2400" dirty="0">
+              <a:solidFill>
+                <a:srgbClr val="FF0000"/>
+              </a:solidFill>
+            </a:endParaRPr>
+          </a:p>
+        </p:txBody>
+      </p:sp>
+      <p:sp>
+        <p:nvSpPr>
+          <p:cNvPr id="26" name="CuadroTexto 25">
+            <a:extLst>
+              <a:ext uri="{FF2B5EF4-FFF2-40B4-BE49-F238E27FC236}">
+                <a16:creationId xmlns:a16="http://schemas.microsoft.com/office/drawing/2014/main" id="{98461B4E-61E8-A5BC-DBF9-DF887A3D4874}"/>
+              </a:ext>
+            </a:extLst>
+          </p:cNvPr>
+          <p:cNvSpPr txBox="1"/>
+          <p:nvPr/>
+        </p:nvSpPr>
+        <p:spPr>
+          <a:xfrm>
+            <a:off x="8561069" y="3412246"/>
+            <a:ext cx="1238914" cy="461665"/>
+          </a:xfrm>
+          <a:prstGeom prst="rect">
+            <a:avLst/>
+          </a:prstGeom>
+          <a:noFill/>
+          <a:ln>
+            <a:noFill/>
+          </a:ln>
+        </p:spPr>
+        <p:style>
+          <a:lnRef idx="0">
+            <a:scrgbClr r="0" g="0" b="0"/>
+          </a:lnRef>
+          <a:fillRef idx="0">
+            <a:scrgbClr r="0" g="0" b="0"/>
+          </a:fillRef>
+          <a:effectRef idx="0">
+            <a:scrgbClr r="0" g="0" b="0"/>
+          </a:effectRef>
+          <a:fontRef idx="minor">
+            <a:schemeClr val="dk1"/>
+          </a:fontRef>
+        </p:style>
+        <p:txBody>
+          <a:bodyPr wrap="square" rtlCol="0">
+            <a:spAutoFit/>
+          </a:bodyPr>
+          <a:lstStyle/>
+          <a:p>
+            <a:r>
+              <a:rPr lang="es-ES" sz="2400" dirty="0" err="1">
+                <a:solidFill>
+                  <a:srgbClr val="FF0000"/>
+                </a:solidFill>
+              </a:rPr>
+              <a:t>column</a:t>
+            </a:r>
+            <a:endParaRPr lang="es-EC" sz="2400" dirty="0">
+              <a:solidFill>
+                <a:srgbClr val="FF0000"/>
+              </a:solidFill>
+            </a:endParaRPr>
+          </a:p>
+        </p:txBody>
+      </p:sp>
+    </p:spTree>
+    <p:extLst>
+      <p:ext uri="{BB962C8B-B14F-4D97-AF65-F5344CB8AC3E}">
+        <p14:creationId xmlns:p14="http://schemas.microsoft.com/office/powerpoint/2010/main" val="2701357522"/>
+      </p:ext>
+    </p:extLst>
+  </p:cSld>
+  <p:clrMapOvr>
+    <a:masterClrMapping/>
+  </p:clrMapOvr>
+  <p:transition spd="slow">
+    <p:push dir="r"/>
+  </p:transition>
+  <p:timing>
+    <p:tnLst>
+      <p:par>
+        <p:cTn id="1" dur="indefinite" restart="never" nodeType="tmRoot">
+          <p:childTnLst>
+            <p:seq concurrent="1" nextAc="seek">
+              <p:cTn id="2" dur="indefinite" nodeType="mainSeq">
+                <p:childTnLst>
+                  <p:par>
+                    <p:cTn id="3" fill="hold">
+                      <p:stCondLst>
+                        <p:cond delay="indefinite"/>
+                      </p:stCondLst>
+                      <p:childTnLst>
+                        <p:par>
+                          <p:cTn id="4" fill="hold">
+                            <p:stCondLst>
+                              <p:cond delay="0"/>
+                            </p:stCondLst>
+                            <p:childTnLst>
+                              <p:par>
+                                <p:cTn id="5" presetID="10" presetClass="entr" presetSubtype="0" fill="hold" grpId="0" nodeType="clickEffect">
+                                  <p:stCondLst>
+                                    <p:cond delay="0"/>
+                                  </p:stCondLst>
+                                  <p:childTnLst>
+                                    <p:set>
+                                      <p:cBhvr>
+                                        <p:cTn id="6" dur="1" fill="hold">
+                                          <p:stCondLst>
+                                            <p:cond delay="0"/>
+                                          </p:stCondLst>
+                                        </p:cTn>
+                                        <p:tgtEl>
+                                          <p:spTgt spid="4"/>
+                                        </p:tgtEl>
+                                        <p:attrNameLst>
+                                          <p:attrName>style.visibility</p:attrName>
+                                        </p:attrNameLst>
+                                      </p:cBhvr>
+                                      <p:to>
+                                        <p:strVal val="visible"/>
+                                      </p:to>
+                                    </p:set>
+                                    <p:animEffect transition="in" filter="fade">
+                                      <p:cBhvr>
+                                        <p:cTn id="7" dur="500"/>
+                                        <p:tgtEl>
+                                          <p:spTgt spid="4"/>
+                                        </p:tgtEl>
+                                      </p:cBhvr>
+                                    </p:animEffect>
+                                  </p:childTnLst>
+                                </p:cTn>
+                              </p:par>
+                              <p:par>
+                                <p:cTn id="8" presetID="10" presetClass="entr" presetSubtype="0" fill="hold" grpId="0" nodeType="withEffect">
+                                  <p:stCondLst>
+                                    <p:cond delay="0"/>
+                                  </p:stCondLst>
+                                  <p:childTnLst>
+                                    <p:set>
+                                      <p:cBhvr>
+                                        <p:cTn id="9" dur="1" fill="hold">
+                                          <p:stCondLst>
+                                            <p:cond delay="0"/>
+                                          </p:stCondLst>
+                                        </p:cTn>
+                                        <p:tgtEl>
+                                          <p:spTgt spid="21"/>
+                                        </p:tgtEl>
+                                        <p:attrNameLst>
+                                          <p:attrName>style.visibility</p:attrName>
+                                        </p:attrNameLst>
+                                      </p:cBhvr>
+                                      <p:to>
+                                        <p:strVal val="visible"/>
+                                      </p:to>
+                                    </p:set>
+                                    <p:animEffect transition="in" filter="fade">
+                                      <p:cBhvr>
+                                        <p:cTn id="10" dur="500"/>
+                                        <p:tgtEl>
+                                          <p:spTgt spid="21"/>
+                                        </p:tgtEl>
+                                      </p:cBhvr>
+                                    </p:animEffect>
+                                  </p:childTnLst>
+                                </p:cTn>
+                              </p:par>
+                            </p:childTnLst>
+                          </p:cTn>
+                        </p:par>
+                      </p:childTnLst>
+                    </p:cTn>
+                  </p:par>
+                  <p:par>
+                    <p:cTn id="11" fill="hold">
+                      <p:stCondLst>
+                        <p:cond delay="indefinite"/>
+                      </p:stCondLst>
+                      <p:childTnLst>
+                        <p:par>
+                          <p:cTn id="12" fill="hold">
+                            <p:stCondLst>
+                              <p:cond delay="0"/>
+                            </p:stCondLst>
+                            <p:childTnLst>
+                              <p:par>
+                                <p:cTn id="13" presetID="2" presetClass="entr" presetSubtype="4" fill="hold" grpId="0" nodeType="clickEffect">
+                                  <p:stCondLst>
+                                    <p:cond delay="0"/>
+                                  </p:stCondLst>
+                                  <p:childTnLst>
+                                    <p:set>
+                                      <p:cBhvr>
+                                        <p:cTn id="14" dur="1" fill="hold">
+                                          <p:stCondLst>
+                                            <p:cond delay="0"/>
+                                          </p:stCondLst>
+                                        </p:cTn>
+                                        <p:tgtEl>
+                                          <p:spTgt spid="5"/>
+                                        </p:tgtEl>
+                                        <p:attrNameLst>
+                                          <p:attrName>style.visibility</p:attrName>
+                                        </p:attrNameLst>
+                                      </p:cBhvr>
+                                      <p:to>
+                                        <p:strVal val="visible"/>
+                                      </p:to>
+                                    </p:set>
+                                    <p:anim calcmode="lin" valueType="num">
+                                      <p:cBhvr additive="base">
+                                        <p:cTn id="15" dur="500" fill="hold"/>
+                                        <p:tgtEl>
+                                          <p:spTgt spid="5"/>
+                                        </p:tgtEl>
+                                        <p:attrNameLst>
+                                          <p:attrName>ppt_x</p:attrName>
+                                        </p:attrNameLst>
+                                      </p:cBhvr>
+                                      <p:tavLst>
+                                        <p:tav tm="0">
+                                          <p:val>
+                                            <p:strVal val="#ppt_x"/>
+                                          </p:val>
+                                        </p:tav>
+                                        <p:tav tm="100000">
+                                          <p:val>
+                                            <p:strVal val="#ppt_x"/>
+                                          </p:val>
+                                        </p:tav>
+                                      </p:tavLst>
+                                    </p:anim>
+                                    <p:anim calcmode="lin" valueType="num">
+                                      <p:cBhvr additive="base">
+                                        <p:cTn id="16" dur="500" fill="hold"/>
+                                        <p:tgtEl>
+                                          <p:spTgt spid="5"/>
+                                        </p:tgtEl>
+                                        <p:attrNameLst>
+                                          <p:attrName>ppt_y</p:attrName>
+                                        </p:attrNameLst>
+                                      </p:cBhvr>
+                                      <p:tavLst>
+                                        <p:tav tm="0">
+                                          <p:val>
+                                            <p:strVal val="1+#ppt_h/2"/>
+                                          </p:val>
+                                        </p:tav>
+                                        <p:tav tm="100000">
+                                          <p:val>
+                                            <p:strVal val="#ppt_y"/>
+                                          </p:val>
+                                        </p:tav>
+                                      </p:tavLst>
+                                    </p:anim>
+                                  </p:childTnLst>
+                                </p:cTn>
+                              </p:par>
+                              <p:par>
+                                <p:cTn id="17" presetID="2" presetClass="entr" presetSubtype="4" fill="hold" grpId="0" nodeType="withEffect">
+                                  <p:stCondLst>
+                                    <p:cond delay="0"/>
+                                  </p:stCondLst>
+                                  <p:childTnLst>
+                                    <p:set>
+                                      <p:cBhvr>
+                                        <p:cTn id="18" dur="1" fill="hold">
+                                          <p:stCondLst>
+                                            <p:cond delay="0"/>
+                                          </p:stCondLst>
+                                        </p:cTn>
+                                        <p:tgtEl>
+                                          <p:spTgt spid="7"/>
+                                        </p:tgtEl>
+                                        <p:attrNameLst>
+                                          <p:attrName>style.visibility</p:attrName>
+                                        </p:attrNameLst>
+                                      </p:cBhvr>
+                                      <p:to>
+                                        <p:strVal val="visible"/>
+                                      </p:to>
+                                    </p:set>
+                                    <p:anim calcmode="lin" valueType="num">
+                                      <p:cBhvr additive="base">
+                                        <p:cTn id="19" dur="500" fill="hold"/>
+                                        <p:tgtEl>
+                                          <p:spTgt spid="7"/>
+                                        </p:tgtEl>
+                                        <p:attrNameLst>
+                                          <p:attrName>ppt_x</p:attrName>
+                                        </p:attrNameLst>
+                                      </p:cBhvr>
+                                      <p:tavLst>
+                                        <p:tav tm="0">
+                                          <p:val>
+                                            <p:strVal val="#ppt_x"/>
+                                          </p:val>
+                                        </p:tav>
+                                        <p:tav tm="100000">
+                                          <p:val>
+                                            <p:strVal val="#ppt_x"/>
+                                          </p:val>
+                                        </p:tav>
+                                      </p:tavLst>
+                                    </p:anim>
+                                    <p:anim calcmode="lin" valueType="num">
+                                      <p:cBhvr additive="base">
+                                        <p:cTn id="20" dur="500" fill="hold"/>
+                                        <p:tgtEl>
+                                          <p:spTgt spid="7"/>
+                                        </p:tgtEl>
+                                        <p:attrNameLst>
+                                          <p:attrName>ppt_y</p:attrName>
+                                        </p:attrNameLst>
+                                      </p:cBhvr>
+                                      <p:tavLst>
+                                        <p:tav tm="0">
+                                          <p:val>
+                                            <p:strVal val="1+#ppt_h/2"/>
+                                          </p:val>
+                                        </p:tav>
+                                        <p:tav tm="100000">
+                                          <p:val>
+                                            <p:strVal val="#ppt_y"/>
+                                          </p:val>
+                                        </p:tav>
+                                      </p:tavLst>
+                                    </p:anim>
+                                  </p:childTnLst>
+                                </p:cTn>
+                              </p:par>
+                              <p:par>
+                                <p:cTn id="21" presetID="2" presetClass="entr" presetSubtype="4" fill="hold" grpId="0" nodeType="withEffect">
+                                  <p:stCondLst>
+                                    <p:cond delay="0"/>
+                                  </p:stCondLst>
+                                  <p:childTnLst>
+                                    <p:set>
+                                      <p:cBhvr>
+                                        <p:cTn id="22" dur="1" fill="hold">
+                                          <p:stCondLst>
+                                            <p:cond delay="0"/>
+                                          </p:stCondLst>
+                                        </p:cTn>
+                                        <p:tgtEl>
+                                          <p:spTgt spid="9"/>
+                                        </p:tgtEl>
+                                        <p:attrNameLst>
+                                          <p:attrName>style.visibility</p:attrName>
+                                        </p:attrNameLst>
+                                      </p:cBhvr>
+                                      <p:to>
+                                        <p:strVal val="visible"/>
+                                      </p:to>
+                                    </p:set>
+                                    <p:anim calcmode="lin" valueType="num">
+                                      <p:cBhvr additive="base">
+                                        <p:cTn id="23" dur="500" fill="hold"/>
+                                        <p:tgtEl>
+                                          <p:spTgt spid="9"/>
+                                        </p:tgtEl>
+                                        <p:attrNameLst>
+                                          <p:attrName>ppt_x</p:attrName>
+                                        </p:attrNameLst>
+                                      </p:cBhvr>
+                                      <p:tavLst>
+                                        <p:tav tm="0">
+                                          <p:val>
+                                            <p:strVal val="#ppt_x"/>
+                                          </p:val>
+                                        </p:tav>
+                                        <p:tav tm="100000">
+                                          <p:val>
+                                            <p:strVal val="#ppt_x"/>
+                                          </p:val>
+                                        </p:tav>
+                                      </p:tavLst>
+                                    </p:anim>
+                                    <p:anim calcmode="lin" valueType="num">
+                                      <p:cBhvr additive="base">
+                                        <p:cTn id="24" dur="500" fill="hold"/>
+                                        <p:tgtEl>
+                                          <p:spTgt spid="9"/>
+                                        </p:tgtEl>
+                                        <p:attrNameLst>
+                                          <p:attrName>ppt_y</p:attrName>
+                                        </p:attrNameLst>
+                                      </p:cBhvr>
+                                      <p:tavLst>
+                                        <p:tav tm="0">
+                                          <p:val>
+                                            <p:strVal val="1+#ppt_h/2"/>
+                                          </p:val>
+                                        </p:tav>
+                                        <p:tav tm="100000">
+                                          <p:val>
+                                            <p:strVal val="#ppt_y"/>
+                                          </p:val>
+                                        </p:tav>
+                                      </p:tavLst>
+                                    </p:anim>
+                                  </p:childTnLst>
+                                </p:cTn>
+                              </p:par>
+                              <p:par>
+                                <p:cTn id="25" presetID="2" presetClass="entr" presetSubtype="4" fill="hold" grpId="0" nodeType="withEffect">
+                                  <p:stCondLst>
+                                    <p:cond delay="0"/>
+                                  </p:stCondLst>
+                                  <p:childTnLst>
+                                    <p:set>
+                                      <p:cBhvr>
+                                        <p:cTn id="26" dur="1" fill="hold">
+                                          <p:stCondLst>
+                                            <p:cond delay="0"/>
+                                          </p:stCondLst>
+                                        </p:cTn>
+                                        <p:tgtEl>
+                                          <p:spTgt spid="15"/>
+                                        </p:tgtEl>
+                                        <p:attrNameLst>
+                                          <p:attrName>style.visibility</p:attrName>
+                                        </p:attrNameLst>
+                                      </p:cBhvr>
+                                      <p:to>
+                                        <p:strVal val="visible"/>
+                                      </p:to>
+                                    </p:set>
+                                    <p:anim calcmode="lin" valueType="num">
+                                      <p:cBhvr additive="base">
+                                        <p:cTn id="27" dur="500" fill="hold"/>
+                                        <p:tgtEl>
+                                          <p:spTgt spid="15"/>
+                                        </p:tgtEl>
+                                        <p:attrNameLst>
+                                          <p:attrName>ppt_x</p:attrName>
+                                        </p:attrNameLst>
+                                      </p:cBhvr>
+                                      <p:tavLst>
+                                        <p:tav tm="0">
+                                          <p:val>
+                                            <p:strVal val="#ppt_x"/>
+                                          </p:val>
+                                        </p:tav>
+                                        <p:tav tm="100000">
+                                          <p:val>
+                                            <p:strVal val="#ppt_x"/>
+                                          </p:val>
+                                        </p:tav>
+                                      </p:tavLst>
+                                    </p:anim>
+                                    <p:anim calcmode="lin" valueType="num">
+                                      <p:cBhvr additive="base">
+                                        <p:cTn id="28" dur="500" fill="hold"/>
+                                        <p:tgtEl>
+                                          <p:spTgt spid="15"/>
+                                        </p:tgtEl>
+                                        <p:attrNameLst>
+                                          <p:attrName>ppt_y</p:attrName>
+                                        </p:attrNameLst>
+                                      </p:cBhvr>
+                                      <p:tavLst>
+                                        <p:tav tm="0">
+                                          <p:val>
+                                            <p:strVal val="1+#ppt_h/2"/>
+                                          </p:val>
+                                        </p:tav>
+                                        <p:tav tm="100000">
+                                          <p:val>
+                                            <p:strVal val="#ppt_y"/>
+                                          </p:val>
+                                        </p:tav>
+                                      </p:tavLst>
+                                    </p:anim>
+                                  </p:childTnLst>
+                                </p:cTn>
+                              </p:par>
+                              <p:par>
+                                <p:cTn id="29" presetID="2" presetClass="entr" presetSubtype="4" fill="hold" grpId="0" nodeType="withEffect">
+                                  <p:stCondLst>
+                                    <p:cond delay="0"/>
+                                  </p:stCondLst>
+                                  <p:childTnLst>
+                                    <p:set>
+                                      <p:cBhvr>
+                                        <p:cTn id="30" dur="1" fill="hold">
+                                          <p:stCondLst>
+                                            <p:cond delay="0"/>
+                                          </p:stCondLst>
+                                        </p:cTn>
+                                        <p:tgtEl>
+                                          <p:spTgt spid="20"/>
+                                        </p:tgtEl>
+                                        <p:attrNameLst>
+                                          <p:attrName>style.visibility</p:attrName>
+                                        </p:attrNameLst>
+                                      </p:cBhvr>
+                                      <p:to>
+                                        <p:strVal val="visible"/>
+                                      </p:to>
+                                    </p:set>
+                                    <p:anim calcmode="lin" valueType="num">
+                                      <p:cBhvr additive="base">
+                                        <p:cTn id="31" dur="500" fill="hold"/>
+                                        <p:tgtEl>
+                                          <p:spTgt spid="20"/>
+                                        </p:tgtEl>
+                                        <p:attrNameLst>
+                                          <p:attrName>ppt_x</p:attrName>
+                                        </p:attrNameLst>
+                                      </p:cBhvr>
+                                      <p:tavLst>
+                                        <p:tav tm="0">
+                                          <p:val>
+                                            <p:strVal val="#ppt_x"/>
+                                          </p:val>
+                                        </p:tav>
+                                        <p:tav tm="100000">
+                                          <p:val>
+                                            <p:strVal val="#ppt_x"/>
+                                          </p:val>
+                                        </p:tav>
+                                      </p:tavLst>
+                                    </p:anim>
+                                    <p:anim calcmode="lin" valueType="num">
+                                      <p:cBhvr additive="base">
+                                        <p:cTn id="32" dur="500" fill="hold"/>
+                                        <p:tgtEl>
+                                          <p:spTgt spid="20"/>
+                                        </p:tgtEl>
+                                        <p:attrNameLst>
+                                          <p:attrName>ppt_y</p:attrName>
+                                        </p:attrNameLst>
+                                      </p:cBhvr>
+                                      <p:tavLst>
+                                        <p:tav tm="0">
+                                          <p:val>
+                                            <p:strVal val="1+#ppt_h/2"/>
+                                          </p:val>
+                                        </p:tav>
+                                        <p:tav tm="100000">
+                                          <p:val>
+                                            <p:strVal val="#ppt_y"/>
+                                          </p:val>
+                                        </p:tav>
+                                      </p:tavLst>
+                                    </p:anim>
+                                  </p:childTnLst>
+                                </p:cTn>
+                              </p:par>
+                              <p:par>
+                                <p:cTn id="33" presetID="2" presetClass="entr" presetSubtype="4" fill="hold" grpId="0" nodeType="withEffect">
+                                  <p:stCondLst>
+                                    <p:cond delay="0"/>
+                                  </p:stCondLst>
+                                  <p:childTnLst>
+                                    <p:set>
+                                      <p:cBhvr>
+                                        <p:cTn id="34" dur="1" fill="hold">
+                                          <p:stCondLst>
+                                            <p:cond delay="0"/>
+                                          </p:stCondLst>
+                                        </p:cTn>
+                                        <p:tgtEl>
+                                          <p:spTgt spid="14"/>
+                                        </p:tgtEl>
+                                        <p:attrNameLst>
+                                          <p:attrName>style.visibility</p:attrName>
+                                        </p:attrNameLst>
+                                      </p:cBhvr>
+                                      <p:to>
+                                        <p:strVal val="visible"/>
+                                      </p:to>
+                                    </p:set>
+                                    <p:anim calcmode="lin" valueType="num">
+                                      <p:cBhvr additive="base">
+                                        <p:cTn id="35" dur="500" fill="hold"/>
+                                        <p:tgtEl>
+                                          <p:spTgt spid="14"/>
+                                        </p:tgtEl>
+                                        <p:attrNameLst>
+                                          <p:attrName>ppt_x</p:attrName>
+                                        </p:attrNameLst>
+                                      </p:cBhvr>
+                                      <p:tavLst>
+                                        <p:tav tm="0">
+                                          <p:val>
+                                            <p:strVal val="#ppt_x"/>
+                                          </p:val>
+                                        </p:tav>
+                                        <p:tav tm="100000">
+                                          <p:val>
+                                            <p:strVal val="#ppt_x"/>
+                                          </p:val>
+                                        </p:tav>
+                                      </p:tavLst>
+                                    </p:anim>
+                                    <p:anim calcmode="lin" valueType="num">
+                                      <p:cBhvr additive="base">
+                                        <p:cTn id="36" dur="500" fill="hold"/>
+                                        <p:tgtEl>
+                                          <p:spTgt spid="14"/>
+                                        </p:tgtEl>
+                                        <p:attrNameLst>
+                                          <p:attrName>ppt_y</p:attrName>
+                                        </p:attrNameLst>
+                                      </p:cBhvr>
+                                      <p:tavLst>
+                                        <p:tav tm="0">
+                                          <p:val>
+                                            <p:strVal val="1+#ppt_h/2"/>
+                                          </p:val>
+                                        </p:tav>
+                                        <p:tav tm="100000">
+                                          <p:val>
+                                            <p:strVal val="#ppt_y"/>
+                                          </p:val>
+                                        </p:tav>
+                                      </p:tavLst>
+                                    </p:anim>
+                                  </p:childTnLst>
+                                </p:cTn>
+                              </p:par>
+                            </p:childTnLst>
+                          </p:cTn>
+                        </p:par>
+                      </p:childTnLst>
+                    </p:cTn>
+                  </p:par>
+                  <p:par>
+                    <p:cTn id="37" fill="hold">
+                      <p:stCondLst>
+                        <p:cond delay="indefinite"/>
+                      </p:stCondLst>
+                      <p:childTnLst>
+                        <p:par>
+                          <p:cTn id="38" fill="hold">
+                            <p:stCondLst>
+                              <p:cond delay="0"/>
+                            </p:stCondLst>
+                            <p:childTnLst>
+                              <p:par>
+                                <p:cTn id="39" presetID="2" presetClass="entr" presetSubtype="4" fill="hold" grpId="0" nodeType="clickEffect">
+                                  <p:stCondLst>
+                                    <p:cond delay="0"/>
+                                  </p:stCondLst>
+                                  <p:childTnLst>
+                                    <p:set>
+                                      <p:cBhvr>
+                                        <p:cTn id="40" dur="1" fill="hold">
+                                          <p:stCondLst>
+                                            <p:cond delay="0"/>
+                                          </p:stCondLst>
+                                        </p:cTn>
+                                        <p:tgtEl>
+                                          <p:spTgt spid="18"/>
+                                        </p:tgtEl>
+                                        <p:attrNameLst>
+                                          <p:attrName>style.visibility</p:attrName>
+                                        </p:attrNameLst>
+                                      </p:cBhvr>
+                                      <p:to>
+                                        <p:strVal val="visible"/>
+                                      </p:to>
+                                    </p:set>
+                                    <p:anim calcmode="lin" valueType="num">
+                                      <p:cBhvr additive="base">
+                                        <p:cTn id="41" dur="500" fill="hold"/>
+                                        <p:tgtEl>
+                                          <p:spTgt spid="18"/>
+                                        </p:tgtEl>
+                                        <p:attrNameLst>
+                                          <p:attrName>ppt_x</p:attrName>
+                                        </p:attrNameLst>
+                                      </p:cBhvr>
+                                      <p:tavLst>
+                                        <p:tav tm="0">
+                                          <p:val>
+                                            <p:strVal val="#ppt_x"/>
+                                          </p:val>
+                                        </p:tav>
+                                        <p:tav tm="100000">
+                                          <p:val>
+                                            <p:strVal val="#ppt_x"/>
+                                          </p:val>
+                                        </p:tav>
+                                      </p:tavLst>
+                                    </p:anim>
+                                    <p:anim calcmode="lin" valueType="num">
+                                      <p:cBhvr additive="base">
+                                        <p:cTn id="42" dur="500" fill="hold"/>
+                                        <p:tgtEl>
+                                          <p:spTgt spid="18"/>
+                                        </p:tgtEl>
+                                        <p:attrNameLst>
+                                          <p:attrName>ppt_y</p:attrName>
+                                        </p:attrNameLst>
+                                      </p:cBhvr>
+                                      <p:tavLst>
+                                        <p:tav tm="0">
+                                          <p:val>
+                                            <p:strVal val="1+#ppt_h/2"/>
+                                          </p:val>
+                                        </p:tav>
+                                        <p:tav tm="100000">
+                                          <p:val>
+                                            <p:strVal val="#ppt_y"/>
+                                          </p:val>
+                                        </p:tav>
+                                      </p:tavLst>
+                                    </p:anim>
+                                  </p:childTnLst>
+                                </p:cTn>
+                              </p:par>
+                              <p:par>
+                                <p:cTn id="43" presetID="2" presetClass="entr" presetSubtype="4" fill="hold" grpId="0" nodeType="withEffect">
+                                  <p:stCondLst>
+                                    <p:cond delay="0"/>
+                                  </p:stCondLst>
+                                  <p:childTnLst>
+                                    <p:set>
+                                      <p:cBhvr>
+                                        <p:cTn id="44" dur="1" fill="hold">
+                                          <p:stCondLst>
+                                            <p:cond delay="0"/>
+                                          </p:stCondLst>
+                                        </p:cTn>
+                                        <p:tgtEl>
+                                          <p:spTgt spid="6"/>
+                                        </p:tgtEl>
+                                        <p:attrNameLst>
+                                          <p:attrName>style.visibility</p:attrName>
+                                        </p:attrNameLst>
+                                      </p:cBhvr>
+                                      <p:to>
+                                        <p:strVal val="visible"/>
+                                      </p:to>
+                                    </p:set>
+                                    <p:anim calcmode="lin" valueType="num">
+                                      <p:cBhvr additive="base">
+                                        <p:cTn id="45" dur="500" fill="hold"/>
+                                        <p:tgtEl>
+                                          <p:spTgt spid="6"/>
+                                        </p:tgtEl>
+                                        <p:attrNameLst>
+                                          <p:attrName>ppt_x</p:attrName>
+                                        </p:attrNameLst>
+                                      </p:cBhvr>
+                                      <p:tavLst>
+                                        <p:tav tm="0">
+                                          <p:val>
+                                            <p:strVal val="#ppt_x"/>
+                                          </p:val>
+                                        </p:tav>
+                                        <p:tav tm="100000">
+                                          <p:val>
+                                            <p:strVal val="#ppt_x"/>
+                                          </p:val>
+                                        </p:tav>
+                                      </p:tavLst>
+                                    </p:anim>
+                                    <p:anim calcmode="lin" valueType="num">
+                                      <p:cBhvr additive="base">
+                                        <p:cTn id="46" dur="500" fill="hold"/>
+                                        <p:tgtEl>
+                                          <p:spTgt spid="6"/>
+                                        </p:tgtEl>
+                                        <p:attrNameLst>
+                                          <p:attrName>ppt_y</p:attrName>
+                                        </p:attrNameLst>
+                                      </p:cBhvr>
+                                      <p:tavLst>
+                                        <p:tav tm="0">
+                                          <p:val>
+                                            <p:strVal val="1+#ppt_h/2"/>
+                                          </p:val>
+                                        </p:tav>
+                                        <p:tav tm="100000">
+                                          <p:val>
+                                            <p:strVal val="#ppt_y"/>
+                                          </p:val>
+                                        </p:tav>
+                                      </p:tavLst>
+                                    </p:anim>
+                                  </p:childTnLst>
+                                </p:cTn>
+                              </p:par>
+                              <p:par>
+                                <p:cTn id="47" presetID="2" presetClass="entr" presetSubtype="4" fill="hold" grpId="0" nodeType="withEffect">
+                                  <p:stCondLst>
+                                    <p:cond delay="0"/>
+                                  </p:stCondLst>
+                                  <p:childTnLst>
+                                    <p:set>
+                                      <p:cBhvr>
+                                        <p:cTn id="48" dur="1" fill="hold">
+                                          <p:stCondLst>
+                                            <p:cond delay="0"/>
+                                          </p:stCondLst>
+                                        </p:cTn>
+                                        <p:tgtEl>
+                                          <p:spTgt spid="10"/>
+                                        </p:tgtEl>
+                                        <p:attrNameLst>
+                                          <p:attrName>style.visibility</p:attrName>
+                                        </p:attrNameLst>
+                                      </p:cBhvr>
+                                      <p:to>
+                                        <p:strVal val="visible"/>
+                                      </p:to>
+                                    </p:set>
+                                    <p:anim calcmode="lin" valueType="num">
+                                      <p:cBhvr additive="base">
+                                        <p:cTn id="49" dur="500" fill="hold"/>
+                                        <p:tgtEl>
+                                          <p:spTgt spid="10"/>
+                                        </p:tgtEl>
+                                        <p:attrNameLst>
+                                          <p:attrName>ppt_x</p:attrName>
+                                        </p:attrNameLst>
+                                      </p:cBhvr>
+                                      <p:tavLst>
+                                        <p:tav tm="0">
+                                          <p:val>
+                                            <p:strVal val="#ppt_x"/>
+                                          </p:val>
+                                        </p:tav>
+                                        <p:tav tm="100000">
+                                          <p:val>
+                                            <p:strVal val="#ppt_x"/>
+                                          </p:val>
+                                        </p:tav>
+                                      </p:tavLst>
+                                    </p:anim>
+                                    <p:anim calcmode="lin" valueType="num">
+                                      <p:cBhvr additive="base">
+                                        <p:cTn id="50" dur="500" fill="hold"/>
+                                        <p:tgtEl>
+                                          <p:spTgt spid="10"/>
+                                        </p:tgtEl>
+                                        <p:attrNameLst>
+                                          <p:attrName>ppt_y</p:attrName>
+                                        </p:attrNameLst>
+                                      </p:cBhvr>
+                                      <p:tavLst>
+                                        <p:tav tm="0">
+                                          <p:val>
+                                            <p:strVal val="1+#ppt_h/2"/>
+                                          </p:val>
+                                        </p:tav>
+                                        <p:tav tm="100000">
+                                          <p:val>
+                                            <p:strVal val="#ppt_y"/>
+                                          </p:val>
+                                        </p:tav>
+                                      </p:tavLst>
+                                    </p:anim>
+                                  </p:childTnLst>
+                                </p:cTn>
+                              </p:par>
+                              <p:par>
+                                <p:cTn id="51" presetID="2" presetClass="entr" presetSubtype="4" fill="hold" grpId="0" nodeType="withEffect">
+                                  <p:stCondLst>
+                                    <p:cond delay="0"/>
+                                  </p:stCondLst>
+                                  <p:childTnLst>
+                                    <p:set>
+                                      <p:cBhvr>
+                                        <p:cTn id="52" dur="1" fill="hold">
+                                          <p:stCondLst>
+                                            <p:cond delay="0"/>
+                                          </p:stCondLst>
+                                        </p:cTn>
+                                        <p:tgtEl>
+                                          <p:spTgt spid="17"/>
+                                        </p:tgtEl>
+                                        <p:attrNameLst>
+                                          <p:attrName>style.visibility</p:attrName>
+                                        </p:attrNameLst>
+                                      </p:cBhvr>
+                                      <p:to>
+                                        <p:strVal val="visible"/>
+                                      </p:to>
+                                    </p:set>
+                                    <p:anim calcmode="lin" valueType="num">
+                                      <p:cBhvr additive="base">
+                                        <p:cTn id="53" dur="500" fill="hold"/>
+                                        <p:tgtEl>
+                                          <p:spTgt spid="17"/>
+                                        </p:tgtEl>
+                                        <p:attrNameLst>
+                                          <p:attrName>ppt_x</p:attrName>
+                                        </p:attrNameLst>
+                                      </p:cBhvr>
+                                      <p:tavLst>
+                                        <p:tav tm="0">
+                                          <p:val>
+                                            <p:strVal val="#ppt_x"/>
+                                          </p:val>
+                                        </p:tav>
+                                        <p:tav tm="100000">
+                                          <p:val>
+                                            <p:strVal val="#ppt_x"/>
+                                          </p:val>
+                                        </p:tav>
+                                      </p:tavLst>
+                                    </p:anim>
+                                    <p:anim calcmode="lin" valueType="num">
+                                      <p:cBhvr additive="base">
+                                        <p:cTn id="54" dur="500" fill="hold"/>
+                                        <p:tgtEl>
+                                          <p:spTgt spid="17"/>
+                                        </p:tgtEl>
+                                        <p:attrNameLst>
+                                          <p:attrName>ppt_y</p:attrName>
+                                        </p:attrNameLst>
+                                      </p:cBhvr>
+                                      <p:tavLst>
+                                        <p:tav tm="0">
+                                          <p:val>
+                                            <p:strVal val="1+#ppt_h/2"/>
+                                          </p:val>
+                                        </p:tav>
+                                        <p:tav tm="100000">
+                                          <p:val>
+                                            <p:strVal val="#ppt_y"/>
+                                          </p:val>
+                                        </p:tav>
+                                      </p:tavLst>
+                                    </p:anim>
+                                  </p:childTnLst>
+                                </p:cTn>
+                              </p:par>
+                              <p:par>
+                                <p:cTn id="55" presetID="2" presetClass="entr" presetSubtype="4" fill="hold" grpId="0" nodeType="withEffect">
+                                  <p:stCondLst>
+                                    <p:cond delay="0"/>
+                                  </p:stCondLst>
+                                  <p:childTnLst>
+                                    <p:set>
+                                      <p:cBhvr>
+                                        <p:cTn id="56" dur="1" fill="hold">
+                                          <p:stCondLst>
+                                            <p:cond delay="0"/>
+                                          </p:stCondLst>
+                                        </p:cTn>
+                                        <p:tgtEl>
+                                          <p:spTgt spid="19"/>
+                                        </p:tgtEl>
+                                        <p:attrNameLst>
+                                          <p:attrName>style.visibility</p:attrName>
+                                        </p:attrNameLst>
+                                      </p:cBhvr>
+                                      <p:to>
+                                        <p:strVal val="visible"/>
+                                      </p:to>
+                                    </p:set>
+                                    <p:anim calcmode="lin" valueType="num">
+                                      <p:cBhvr additive="base">
+                                        <p:cTn id="57" dur="500" fill="hold"/>
+                                        <p:tgtEl>
+                                          <p:spTgt spid="19"/>
+                                        </p:tgtEl>
+                                        <p:attrNameLst>
+                                          <p:attrName>ppt_x</p:attrName>
+                                        </p:attrNameLst>
+                                      </p:cBhvr>
+                                      <p:tavLst>
+                                        <p:tav tm="0">
+                                          <p:val>
+                                            <p:strVal val="#ppt_x"/>
+                                          </p:val>
+                                        </p:tav>
+                                        <p:tav tm="100000">
+                                          <p:val>
+                                            <p:strVal val="#ppt_x"/>
+                                          </p:val>
+                                        </p:tav>
+                                      </p:tavLst>
+                                    </p:anim>
+                                    <p:anim calcmode="lin" valueType="num">
+                                      <p:cBhvr additive="base">
+                                        <p:cTn id="58" dur="500" fill="hold"/>
+                                        <p:tgtEl>
+                                          <p:spTgt spid="19"/>
+                                        </p:tgtEl>
+                                        <p:attrNameLst>
+                                          <p:attrName>ppt_y</p:attrName>
+                                        </p:attrNameLst>
+                                      </p:cBhvr>
+                                      <p:tavLst>
+                                        <p:tav tm="0">
+                                          <p:val>
+                                            <p:strVal val="1+#ppt_h/2"/>
+                                          </p:val>
+                                        </p:tav>
+                                        <p:tav tm="100000">
+                                          <p:val>
+                                            <p:strVal val="#ppt_y"/>
+                                          </p:val>
+                                        </p:tav>
+                                      </p:tavLst>
+                                    </p:anim>
+                                  </p:childTnLst>
+                                </p:cTn>
+                              </p:par>
+                              <p:par>
+                                <p:cTn id="59" presetID="2" presetClass="entr" presetSubtype="4" fill="hold" grpId="0" nodeType="withEffect">
+                                  <p:stCondLst>
+                                    <p:cond delay="0"/>
+                                  </p:stCondLst>
+                                  <p:childTnLst>
+                                    <p:set>
+                                      <p:cBhvr>
+                                        <p:cTn id="60" dur="1" fill="hold">
+                                          <p:stCondLst>
+                                            <p:cond delay="0"/>
+                                          </p:stCondLst>
+                                        </p:cTn>
+                                        <p:tgtEl>
+                                          <p:spTgt spid="12"/>
+                                        </p:tgtEl>
+                                        <p:attrNameLst>
+                                          <p:attrName>style.visibility</p:attrName>
+                                        </p:attrNameLst>
+                                      </p:cBhvr>
+                                      <p:to>
+                                        <p:strVal val="visible"/>
+                                      </p:to>
+                                    </p:set>
+                                    <p:anim calcmode="lin" valueType="num">
+                                      <p:cBhvr additive="base">
+                                        <p:cTn id="61" dur="500" fill="hold"/>
+                                        <p:tgtEl>
+                                          <p:spTgt spid="12"/>
+                                        </p:tgtEl>
+                                        <p:attrNameLst>
+                                          <p:attrName>ppt_x</p:attrName>
+                                        </p:attrNameLst>
+                                      </p:cBhvr>
+                                      <p:tavLst>
+                                        <p:tav tm="0">
+                                          <p:val>
+                                            <p:strVal val="#ppt_x"/>
+                                          </p:val>
+                                        </p:tav>
+                                        <p:tav tm="100000">
+                                          <p:val>
+                                            <p:strVal val="#ppt_x"/>
+                                          </p:val>
+                                        </p:tav>
+                                      </p:tavLst>
+                                    </p:anim>
+                                    <p:anim calcmode="lin" valueType="num">
+                                      <p:cBhvr additive="base">
+                                        <p:cTn id="62" dur="500" fill="hold"/>
+                                        <p:tgtEl>
+                                          <p:spTgt spid="12"/>
+                                        </p:tgtEl>
+                                        <p:attrNameLst>
+                                          <p:attrName>ppt_y</p:attrName>
+                                        </p:attrNameLst>
+                                      </p:cBhvr>
+                                      <p:tavLst>
+                                        <p:tav tm="0">
+                                          <p:val>
+                                            <p:strVal val="1+#ppt_h/2"/>
+                                          </p:val>
+                                        </p:tav>
+                                        <p:tav tm="100000">
+                                          <p:val>
+                                            <p:strVal val="#ppt_y"/>
+                                          </p:val>
+                                        </p:tav>
+                                      </p:tavLst>
+                                    </p:anim>
+                                  </p:childTnLst>
+                                </p:cTn>
+                              </p:par>
+                              <p:par>
+                                <p:cTn id="63" presetID="2" presetClass="entr" presetSubtype="4" fill="hold" grpId="0" nodeType="withEffect">
+                                  <p:stCondLst>
+                                    <p:cond delay="0"/>
+                                  </p:stCondLst>
+                                  <p:childTnLst>
+                                    <p:set>
+                                      <p:cBhvr>
+                                        <p:cTn id="64" dur="1" fill="hold">
+                                          <p:stCondLst>
+                                            <p:cond delay="0"/>
+                                          </p:stCondLst>
+                                        </p:cTn>
+                                        <p:tgtEl>
+                                          <p:spTgt spid="25"/>
+                                        </p:tgtEl>
+                                        <p:attrNameLst>
+                                          <p:attrName>style.visibility</p:attrName>
+                                        </p:attrNameLst>
+                                      </p:cBhvr>
+                                      <p:to>
+                                        <p:strVal val="visible"/>
+                                      </p:to>
+                                    </p:set>
+                                    <p:anim calcmode="lin" valueType="num">
+                                      <p:cBhvr additive="base">
+                                        <p:cTn id="65" dur="500" fill="hold"/>
+                                        <p:tgtEl>
+                                          <p:spTgt spid="25"/>
+                                        </p:tgtEl>
+                                        <p:attrNameLst>
+                                          <p:attrName>ppt_x</p:attrName>
+                                        </p:attrNameLst>
+                                      </p:cBhvr>
+                                      <p:tavLst>
+                                        <p:tav tm="0">
+                                          <p:val>
+                                            <p:strVal val="#ppt_x"/>
+                                          </p:val>
+                                        </p:tav>
+                                        <p:tav tm="100000">
+                                          <p:val>
+                                            <p:strVal val="#ppt_x"/>
+                                          </p:val>
+                                        </p:tav>
+                                      </p:tavLst>
+                                    </p:anim>
+                                    <p:anim calcmode="lin" valueType="num">
+                                      <p:cBhvr additive="base">
+                                        <p:cTn id="66" dur="500" fill="hold"/>
+                                        <p:tgtEl>
+                                          <p:spTgt spid="25"/>
+                                        </p:tgtEl>
+                                        <p:attrNameLst>
+                                          <p:attrName>ppt_y</p:attrName>
+                                        </p:attrNameLst>
+                                      </p:cBhvr>
+                                      <p:tavLst>
+                                        <p:tav tm="0">
+                                          <p:val>
+                                            <p:strVal val="1+#ppt_h/2"/>
+                                          </p:val>
+                                        </p:tav>
+                                        <p:tav tm="100000">
+                                          <p:val>
+                                            <p:strVal val="#ppt_y"/>
+                                          </p:val>
+                                        </p:tav>
+                                      </p:tavLst>
+                                    </p:anim>
+                                  </p:childTnLst>
+                                </p:cTn>
+                              </p:par>
+                              <p:par>
+                                <p:cTn id="67" presetID="2" presetClass="entr" presetSubtype="4" fill="hold" grpId="0" nodeType="withEffect">
+                                  <p:stCondLst>
+                                    <p:cond delay="0"/>
+                                  </p:stCondLst>
+                                  <p:childTnLst>
+                                    <p:set>
+                                      <p:cBhvr>
+                                        <p:cTn id="68" dur="1" fill="hold">
+                                          <p:stCondLst>
+                                            <p:cond delay="0"/>
+                                          </p:stCondLst>
+                                        </p:cTn>
+                                        <p:tgtEl>
+                                          <p:spTgt spid="26"/>
+                                        </p:tgtEl>
+                                        <p:attrNameLst>
+                                          <p:attrName>style.visibility</p:attrName>
+                                        </p:attrNameLst>
+                                      </p:cBhvr>
+                                      <p:to>
+                                        <p:strVal val="visible"/>
+                                      </p:to>
+                                    </p:set>
+                                    <p:anim calcmode="lin" valueType="num">
+                                      <p:cBhvr additive="base">
+                                        <p:cTn id="69" dur="500" fill="hold"/>
+                                        <p:tgtEl>
+                                          <p:spTgt spid="26"/>
+                                        </p:tgtEl>
+                                        <p:attrNameLst>
+                                          <p:attrName>ppt_x</p:attrName>
+                                        </p:attrNameLst>
+                                      </p:cBhvr>
+                                      <p:tavLst>
+                                        <p:tav tm="0">
+                                          <p:val>
+                                            <p:strVal val="#ppt_x"/>
+                                          </p:val>
+                                        </p:tav>
+                                        <p:tav tm="100000">
+                                          <p:val>
+                                            <p:strVal val="#ppt_x"/>
+                                          </p:val>
+                                        </p:tav>
+                                      </p:tavLst>
+                                    </p:anim>
+                                    <p:anim calcmode="lin" valueType="num">
+                                      <p:cBhvr additive="base">
+                                        <p:cTn id="70" dur="500" fill="hold"/>
+                                        <p:tgtEl>
+                                          <p:spTgt spid="26"/>
+                                        </p:tgtEl>
+                                        <p:attrNameLst>
+                                          <p:attrName>ppt_y</p:attrName>
+                                        </p:attrNameLst>
+                                      </p:cBhvr>
+                                      <p:tavLst>
+                                        <p:tav tm="0">
+                                          <p:val>
+                                            <p:strVal val="1+#ppt_h/2"/>
+                                          </p:val>
+                                        </p:tav>
+                                        <p:tav tm="100000">
+                                          <p:val>
+                                            <p:strVal val="#ppt_y"/>
+                                          </p:val>
+                                        </p:tav>
+                                      </p:tavLst>
+                                    </p:anim>
+                                  </p:childTnLst>
+                                </p:cTn>
+                              </p:par>
+                            </p:childTnLst>
+                          </p:cTn>
+                        </p:par>
+                      </p:childTnLst>
+                    </p:cTn>
+                  </p:par>
+                </p:childTnLst>
+              </p:cTn>
+              <p:prevCondLst>
+                <p:cond evt="onPrev" delay="0">
+                  <p:tgtEl>
+                    <p:sldTgt/>
+                  </p:tgtEl>
+                </p:cond>
+              </p:prevCondLst>
+              <p:nextCondLst>
+                <p:cond evt="onNext" delay="0">
+                  <p:tgtEl>
+                    <p:sldTgt/>
+                  </p:tgtEl>
+                </p:cond>
+              </p:nextCondLst>
+            </p:seq>
+          </p:childTnLst>
+        </p:cTn>
+      </p:par>
+    </p:tnLst>
+    <p:bldLst>
+      <p:bldP spid="4" grpId="0" animBg="1"/>
+      <p:bldP spid="5" grpId="0" animBg="1"/>
+      <p:bldP spid="6" grpId="0" animBg="1"/>
+      <p:bldP spid="7" grpId="0" animBg="1"/>
+      <p:bldP spid="9" grpId="0" animBg="1"/>
+      <p:bldP spid="10" grpId="0" animBg="1"/>
+      <p:bldP spid="12" grpId="0" animBg="1"/>
+      <p:bldP spid="14" grpId="0"/>
+      <p:bldP spid="15" grpId="0"/>
+      <p:bldP spid="17" grpId="0"/>
+      <p:bldP spid="18" grpId="0"/>
+      <p:bldP spid="19" grpId="0"/>
+      <p:bldP spid="20" grpId="0"/>
+      <p:bldP spid="21" grpId="0"/>
+      <p:bldP spid="25" grpId="0"/>
+      <p:bldP spid="26" grpId="0"/>
+    </p:bldLst>
+  </p:timing>
+</p:sld>
+</file>
+
+<file path=ppt/slides/slide5.xml><?xml version="1.0" encoding="utf-8"?>
+<p:sld xmlns:a="http://schemas.openxmlformats.org/drawingml/2006/main" xmlns:r="http://schemas.openxmlformats.org/officeDocument/2006/relationships" xmlns:p="http://schemas.openxmlformats.org/presentationml/2006/main">
+  <p:cSld>
+    <p:spTree>
+      <p:nvGrpSpPr>
+        <p:cNvPr id="1" name=""/>
+        <p:cNvGrpSpPr/>
+        <p:nvPr/>
+      </p:nvGrpSpPr>
+      <p:grpSpPr>
+        <a:xfrm>
+          <a:off x="0" y="0"/>
+          <a:ext cx="0" cy="0"/>
+          <a:chOff x="0" y="0"/>
+          <a:chExt cx="0" cy="0"/>
+        </a:xfrm>
+      </p:grpSpPr>
+      <p:sp>
+        <p:nvSpPr>
+          <p:cNvPr id="2" name="Título 1">
+            <a:extLst>
+              <a:ext uri="{FF2B5EF4-FFF2-40B4-BE49-F238E27FC236}">
+                <a16:creationId xmlns:a16="http://schemas.microsoft.com/office/drawing/2014/main" id="{4E047C06-26DC-EB26-4432-1CB228B02389}"/>
+              </a:ext>
+            </a:extLst>
+          </p:cNvPr>
+          <p:cNvSpPr>
+            <a:spLocks noGrp="1"/>
+          </p:cNvSpPr>
+          <p:nvPr>
+            <p:ph type="title"/>
+          </p:nvPr>
+        </p:nvSpPr>
+        <p:spPr/>
+        <p:txBody>
+          <a:bodyPr/>
+          <a:lstStyle/>
+          <a:p>
+            <a:endParaRPr lang="es-EC" dirty="0"/>
+          </a:p>
+        </p:txBody>
+      </p:sp>
+      <p:sp>
+        <p:nvSpPr>
+          <p:cNvPr id="3" name="Marcador de contenido 2">
+            <a:extLst>
+              <a:ext uri="{FF2B5EF4-FFF2-40B4-BE49-F238E27FC236}">
+                <a16:creationId xmlns:a16="http://schemas.microsoft.com/office/drawing/2014/main" id="{7875DB20-B471-3684-4A37-6D88E72C3DE0}"/>
+              </a:ext>
+            </a:extLst>
+          </p:cNvPr>
+          <p:cNvSpPr>
+            <a:spLocks noGrp="1"/>
+          </p:cNvSpPr>
+          <p:nvPr>
+            <p:ph idx="1"/>
+          </p:nvPr>
+        </p:nvSpPr>
+        <p:spPr/>
+        <p:txBody>
+          <a:bodyPr/>
+          <a:lstStyle/>
+          <a:p>
+            <a:endParaRPr lang="es-EC"/>
+          </a:p>
+        </p:txBody>
+      </p:sp>
+    </p:spTree>
+    <p:extLst>
+      <p:ext uri="{BB962C8B-B14F-4D97-AF65-F5344CB8AC3E}">
+        <p14:creationId xmlns:p14="http://schemas.microsoft.com/office/powerpoint/2010/main" val="3086726509"/>
+      </p:ext>
+    </p:extLst>
+  </p:cSld>
+  <p:clrMapOvr>
+    <a:masterClrMapping/>
+  </p:clrMapOvr>
+</p:sld>
+</file>
+
+<file path=ppt/slides/slide6.xml><?xml version="1.0" encoding="utf-8"?>
 <p:sld xmlns:a="http://schemas.openxmlformats.org/drawingml/2006/main" xmlns:r="http://schemas.openxmlformats.org/officeDocument/2006/relationships" xmlns:p="http://schemas.openxmlformats.org/presentationml/2006/main">
   <p:cSld>
     <p:bg>
@@ -4422,99 +8497,7 @@
 </p:sld>
 </file>
 
-<file path=ppt/slides/slide3.xml><?xml version="1.0" encoding="utf-8"?>
-<p:sld xmlns:a="http://schemas.openxmlformats.org/drawingml/2006/main" xmlns:r="http://schemas.openxmlformats.org/officeDocument/2006/relationships" xmlns:p="http://schemas.openxmlformats.org/presentationml/2006/main">
-  <p:cSld>
-    <p:spTree>
-      <p:nvGrpSpPr>
-        <p:cNvPr id="1" name=""/>
-        <p:cNvGrpSpPr/>
-        <p:nvPr/>
-      </p:nvGrpSpPr>
-      <p:grpSpPr>
-        <a:xfrm>
-          <a:off x="0" y="0"/>
-          <a:ext cx="0" cy="0"/>
-          <a:chOff x="0" y="0"/>
-          <a:chExt cx="0" cy="0"/>
-        </a:xfrm>
-      </p:grpSpPr>
-      <p:sp>
-        <p:nvSpPr>
-          <p:cNvPr id="2" name="Título 1">
-            <a:extLst>
-              <a:ext uri="{FF2B5EF4-FFF2-40B4-BE49-F238E27FC236}">
-                <a16:creationId xmlns:a16="http://schemas.microsoft.com/office/drawing/2014/main" id="{77FC902F-0F03-C645-BFBC-C5944312F120}"/>
-              </a:ext>
-            </a:extLst>
-          </p:cNvPr>
-          <p:cNvSpPr>
-            <a:spLocks noGrp="1"/>
-          </p:cNvSpPr>
-          <p:nvPr>
-            <p:ph type="title"/>
-          </p:nvPr>
-        </p:nvSpPr>
-        <p:spPr/>
-        <p:txBody>
-          <a:bodyPr>
-            <a:normAutofit/>
-          </a:bodyPr>
-          <a:lstStyle/>
-          <a:p>
-            <a:r>
-              <a:rPr lang="es-ES" sz="6000" b="1" dirty="0"/>
-              <a:t>Etiqueta &lt;div&gt;</a:t>
-            </a:r>
-            <a:endParaRPr lang="es-EC" sz="6000" b="1" dirty="0"/>
-          </a:p>
-        </p:txBody>
-      </p:sp>
-      <p:sp>
-        <p:nvSpPr>
-          <p:cNvPr id="3" name="Marcador de contenido 2">
-            <a:extLst>
-              <a:ext uri="{FF2B5EF4-FFF2-40B4-BE49-F238E27FC236}">
-                <a16:creationId xmlns:a16="http://schemas.microsoft.com/office/drawing/2014/main" id="{2C5E67F1-C968-B8D1-0A2E-7BE8B7FAD9B0}"/>
-              </a:ext>
-            </a:extLst>
-          </p:cNvPr>
-          <p:cNvSpPr>
-            <a:spLocks noGrp="1"/>
-          </p:cNvSpPr>
-          <p:nvPr>
-            <p:ph idx="1"/>
-          </p:nvPr>
-        </p:nvSpPr>
-        <p:spPr/>
-        <p:txBody>
-          <a:bodyPr>
-            <a:normAutofit/>
-          </a:bodyPr>
-          <a:lstStyle/>
-          <a:p>
-            <a:r>
-              <a:rPr lang="es-ES" sz="2800" dirty="0"/>
-              <a:t>Una etiqueta div es una etiqueta que define las divisiones lógicas existentes en el contenido de una página web.</a:t>
-            </a:r>
-            <a:endParaRPr lang="es-EC" sz="2800" dirty="0"/>
-          </a:p>
-        </p:txBody>
-      </p:sp>
-    </p:spTree>
-    <p:extLst>
-      <p:ext uri="{BB962C8B-B14F-4D97-AF65-F5344CB8AC3E}">
-        <p14:creationId xmlns:p14="http://schemas.microsoft.com/office/powerpoint/2010/main" val="1654506962"/>
-      </p:ext>
-    </p:extLst>
-  </p:cSld>
-  <p:clrMapOvr>
-    <a:masterClrMapping/>
-  </p:clrMapOvr>
-</p:sld>
-</file>
-
-<file path=ppt/slides/slide4.xml><?xml version="1.0" encoding="utf-8"?>
+<file path=ppt/slides/slide7.xml><?xml version="1.0" encoding="utf-8"?>
 <p:sld xmlns:a="http://schemas.openxmlformats.org/drawingml/2006/main" xmlns:r="http://schemas.openxmlformats.org/officeDocument/2006/relationships" xmlns:p="http://schemas.openxmlformats.org/presentationml/2006/main">
   <p:cSld>
     <p:spTree>
@@ -4854,4 +8837,319 @@
     </a:ext>
   </a:extLst>
 </a:theme>
+</file>
+
+<file path=ppt/theme/theme2.xml><?xml version="1.0" encoding="utf-8"?>
+<a:theme xmlns:a="http://schemas.openxmlformats.org/drawingml/2006/main" name="Tema de Office">
+  <a:themeElements>
+    <a:clrScheme name="Office">
+      <a:dk1>
+        <a:sysClr val="windowText" lastClr="000000"/>
+      </a:dk1>
+      <a:lt1>
+        <a:sysClr val="window" lastClr="FFFFFF"/>
+      </a:lt1>
+      <a:dk2>
+        <a:srgbClr val="0E2841"/>
+      </a:dk2>
+      <a:lt2>
+        <a:srgbClr val="E8E8E8"/>
+      </a:lt2>
+      <a:accent1>
+        <a:srgbClr val="156082"/>
+      </a:accent1>
+      <a:accent2>
+        <a:srgbClr val="E97132"/>
+      </a:accent2>
+      <a:accent3>
+        <a:srgbClr val="196B24"/>
+      </a:accent3>
+      <a:accent4>
+        <a:srgbClr val="0F9ED5"/>
+      </a:accent4>
+      <a:accent5>
+        <a:srgbClr val="A02B93"/>
+      </a:accent5>
+      <a:accent6>
+        <a:srgbClr val="4EA72E"/>
+      </a:accent6>
+      <a:hlink>
+        <a:srgbClr val="467886"/>
+      </a:hlink>
+      <a:folHlink>
+        <a:srgbClr val="96607D"/>
+      </a:folHlink>
+    </a:clrScheme>
+    <a:fontScheme name="Office">
+      <a:majorFont>
+        <a:latin typeface="Aptos Display" panose="02110004020202020204"/>
+        <a:ea typeface=""/>
+        <a:cs typeface=""/>
+        <a:font script="Jpan" typeface="游ゴシック Light"/>
+        <a:font script="Hang" typeface="맑은 고딕"/>
+        <a:font script="Hans" typeface="等线 Light"/>
+        <a:font script="Hant" typeface="新細明體"/>
+        <a:font script="Arab" typeface="Times New Roman"/>
+        <a:font script="Hebr" typeface="Times New Roman"/>
+        <a:font script="Thai" typeface="Angsana New"/>
+        <a:font script="Ethi" typeface="Nyala"/>
+        <a:font script="Beng" typeface="Vrinda"/>
+        <a:font script="Gujr" typeface="Shruti"/>
+        <a:font script="Khmr" typeface="MoolBoran"/>
+        <a:font script="Knda" typeface="Tunga"/>
+        <a:font script="Guru" typeface="Raavi"/>
+        <a:font script="Cans" typeface="Euphemia"/>
+        <a:font script="Cher" typeface="Plantagenet Cherokee"/>
+        <a:font script="Yiii" typeface="Microsoft Yi Baiti"/>
+        <a:font script="Tibt" typeface="Microsoft Himalaya"/>
+        <a:font script="Thaa" typeface="MV Boli"/>
+        <a:font script="Deva" typeface="Mangal"/>
+        <a:font script="Telu" typeface="Gautami"/>
+        <a:font script="Taml" typeface="Latha"/>
+        <a:font script="Syrc" typeface="Estrangelo Edessa"/>
+        <a:font script="Orya" typeface="Kalinga"/>
+        <a:font script="Mlym" typeface="Kartika"/>
+        <a:font script="Laoo" typeface="DokChampa"/>
+        <a:font script="Sinh" typeface="Iskoola Pota"/>
+        <a:font script="Mong" typeface="Mongolian Baiti"/>
+        <a:font script="Viet" typeface="Times New Roman"/>
+        <a:font script="Uigh" typeface="Microsoft Uighur"/>
+        <a:font script="Geor" typeface="Sylfaen"/>
+        <a:font script="Armn" typeface="Arial"/>
+        <a:font script="Bugi" typeface="Leelawadee UI"/>
+        <a:font script="Bopo" typeface="Microsoft JhengHei"/>
+        <a:font script="Java" typeface="Javanese Text"/>
+        <a:font script="Lisu" typeface="Segoe UI"/>
+        <a:font script="Mymr" typeface="Myanmar Text"/>
+        <a:font script="Nkoo" typeface="Ebrima"/>
+        <a:font script="Olck" typeface="Nirmala UI"/>
+        <a:font script="Osma" typeface="Ebrima"/>
+        <a:font script="Phag" typeface="Phagspa"/>
+        <a:font script="Syrn" typeface="Estrangelo Edessa"/>
+        <a:font script="Syrj" typeface="Estrangelo Edessa"/>
+        <a:font script="Syre" typeface="Estrangelo Edessa"/>
+        <a:font script="Sora" typeface="Nirmala UI"/>
+        <a:font script="Tale" typeface="Microsoft Tai Le"/>
+        <a:font script="Talu" typeface="Microsoft New Tai Lue"/>
+        <a:font script="Tfng" typeface="Ebrima"/>
+      </a:majorFont>
+      <a:minorFont>
+        <a:latin typeface="Aptos" panose="02110004020202020204"/>
+        <a:ea typeface=""/>
+        <a:cs typeface=""/>
+        <a:font script="Jpan" typeface="游ゴシック"/>
+        <a:font script="Hang" typeface="맑은 고딕"/>
+        <a:font script="Hans" typeface="等线"/>
+        <a:font script="Hant" typeface="新細明體"/>
+        <a:font script="Arab" typeface="Arial"/>
+        <a:font script="Hebr" typeface="Arial"/>
+        <a:font script="Thai" typeface="Cordia New"/>
+        <a:font script="Ethi" typeface="Nyala"/>
+        <a:font script="Beng" typeface="Vrinda"/>
+        <a:font script="Gujr" typeface="Shruti"/>
+        <a:font script="Khmr" typeface="DaunPenh"/>
+        <a:font script="Knda" typeface="Tunga"/>
+        <a:font script="Guru" typeface="Raavi"/>
+        <a:font script="Cans" typeface="Euphemia"/>
+        <a:font script="Cher" typeface="Plantagenet Cherokee"/>
+        <a:font script="Yiii" typeface="Microsoft Yi Baiti"/>
+        <a:font script="Tibt" typeface="Microsoft Himalaya"/>
+        <a:font script="Thaa" typeface="MV Boli"/>
+        <a:font script="Deva" typeface="Mangal"/>
+        <a:font script="Telu" typeface="Gautami"/>
+        <a:font script="Taml" typeface="Latha"/>
+        <a:font script="Syrc" typeface="Estrangelo Edessa"/>
+        <a:font script="Orya" typeface="Kalinga"/>
+        <a:font script="Mlym" typeface="Kartika"/>
+        <a:font script="Laoo" typeface="DokChampa"/>
+        <a:font script="Sinh" typeface="Iskoola Pota"/>
+        <a:font script="Mong" typeface="Mongolian Baiti"/>
+        <a:font script="Viet" typeface="Arial"/>
+        <a:font script="Uigh" typeface="Microsoft Uighur"/>
+        <a:font script="Geor" typeface="Sylfaen"/>
+        <a:font script="Armn" typeface="Arial"/>
+        <a:font script="Bugi" typeface="Leelawadee UI"/>
+        <a:font script="Bopo" typeface="Microsoft JhengHei"/>
+        <a:font script="Java" typeface="Javanese Text"/>
+        <a:font script="Lisu" typeface="Segoe UI"/>
+        <a:font script="Mymr" typeface="Myanmar Text"/>
+        <a:font script="Nkoo" typeface="Ebrima"/>
+        <a:font script="Olck" typeface="Nirmala UI"/>
+        <a:font script="Osma" typeface="Ebrima"/>
+        <a:font script="Phag" typeface="Phagspa"/>
+        <a:font script="Syrn" typeface="Estrangelo Edessa"/>
+        <a:font script="Syrj" typeface="Estrangelo Edessa"/>
+        <a:font script="Syre" typeface="Estrangelo Edessa"/>
+        <a:font script="Sora" typeface="Nirmala UI"/>
+        <a:font script="Tale" typeface="Microsoft Tai Le"/>
+        <a:font script="Talu" typeface="Microsoft New Tai Lue"/>
+        <a:font script="Tfng" typeface="Ebrima"/>
+      </a:minorFont>
+    </a:fontScheme>
+    <a:fmtScheme name="Office">
+      <a:fillStyleLst>
+        <a:solidFill>
+          <a:schemeClr val="phClr"/>
+        </a:solidFill>
+        <a:gradFill rotWithShape="1">
+          <a:gsLst>
+            <a:gs pos="0">
+              <a:schemeClr val="phClr">
+                <a:lumMod val="110000"/>
+                <a:satMod val="105000"/>
+                <a:tint val="67000"/>
+              </a:schemeClr>
+            </a:gs>
+            <a:gs pos="50000">
+              <a:schemeClr val="phClr">
+                <a:lumMod val="105000"/>
+                <a:satMod val="103000"/>
+                <a:tint val="73000"/>
+              </a:schemeClr>
+            </a:gs>
+            <a:gs pos="100000">
+              <a:schemeClr val="phClr">
+                <a:lumMod val="105000"/>
+                <a:satMod val="109000"/>
+                <a:tint val="81000"/>
+              </a:schemeClr>
+            </a:gs>
+          </a:gsLst>
+          <a:lin ang="5400000" scaled="0"/>
+        </a:gradFill>
+        <a:gradFill rotWithShape="1">
+          <a:gsLst>
+            <a:gs pos="0">
+              <a:schemeClr val="phClr">
+                <a:satMod val="103000"/>
+                <a:lumMod val="102000"/>
+                <a:tint val="94000"/>
+              </a:schemeClr>
+            </a:gs>
+            <a:gs pos="50000">
+              <a:schemeClr val="phClr">
+                <a:satMod val="110000"/>
+                <a:lumMod val="100000"/>
+                <a:shade val="100000"/>
+              </a:schemeClr>
+            </a:gs>
+            <a:gs pos="100000">
+              <a:schemeClr val="phClr">
+                <a:lumMod val="99000"/>
+                <a:satMod val="120000"/>
+                <a:shade val="78000"/>
+              </a:schemeClr>
+            </a:gs>
+          </a:gsLst>
+          <a:lin ang="5400000" scaled="0"/>
+        </a:gradFill>
+      </a:fillStyleLst>
+      <a:lnStyleLst>
+        <a:ln w="12700" cap="flat" cmpd="sng" algn="ctr">
+          <a:solidFill>
+            <a:schemeClr val="phClr"/>
+          </a:solidFill>
+          <a:prstDash val="solid"/>
+          <a:miter lim="800000"/>
+        </a:ln>
+        <a:ln w="19050" cap="flat" cmpd="sng" algn="ctr">
+          <a:solidFill>
+            <a:schemeClr val="phClr"/>
+          </a:solidFill>
+          <a:prstDash val="solid"/>
+          <a:miter lim="800000"/>
+        </a:ln>
+        <a:ln w="25400" cap="flat" cmpd="sng" algn="ctr">
+          <a:solidFill>
+            <a:schemeClr val="phClr"/>
+          </a:solidFill>
+          <a:prstDash val="solid"/>
+          <a:miter lim="800000"/>
+        </a:ln>
+      </a:lnStyleLst>
+      <a:effectStyleLst>
+        <a:effectStyle>
+          <a:effectLst/>
+        </a:effectStyle>
+        <a:effectStyle>
+          <a:effectLst/>
+        </a:effectStyle>
+        <a:effectStyle>
+          <a:effectLst>
+            <a:outerShdw blurRad="57150" dist="19050" dir="5400000" algn="ctr" rotWithShape="0">
+              <a:srgbClr val="000000">
+                <a:alpha val="63000"/>
+              </a:srgbClr>
+            </a:outerShdw>
+          </a:effectLst>
+        </a:effectStyle>
+      </a:effectStyleLst>
+      <a:bgFillStyleLst>
+        <a:solidFill>
+          <a:schemeClr val="phClr"/>
+        </a:solidFill>
+        <a:solidFill>
+          <a:schemeClr val="phClr">
+            <a:tint val="95000"/>
+            <a:satMod val="170000"/>
+          </a:schemeClr>
+        </a:solidFill>
+        <a:gradFill rotWithShape="1">
+          <a:gsLst>
+            <a:gs pos="0">
+              <a:schemeClr val="phClr">
+                <a:tint val="93000"/>
+                <a:satMod val="150000"/>
+                <a:shade val="98000"/>
+                <a:lumMod val="102000"/>
+              </a:schemeClr>
+            </a:gs>
+            <a:gs pos="50000">
+              <a:schemeClr val="phClr">
+                <a:tint val="98000"/>
+                <a:satMod val="130000"/>
+                <a:shade val="90000"/>
+                <a:lumMod val="103000"/>
+              </a:schemeClr>
+            </a:gs>
+            <a:gs pos="100000">
+              <a:schemeClr val="phClr">
+                <a:shade val="63000"/>
+                <a:satMod val="120000"/>
+              </a:schemeClr>
+            </a:gs>
+          </a:gsLst>
+          <a:lin ang="5400000" scaled="0"/>
+        </a:gradFill>
+      </a:bgFillStyleLst>
+    </a:fmtScheme>
+  </a:themeElements>
+  <a:objectDefaults>
+    <a:lnDef>
+      <a:spPr/>
+      <a:bodyPr/>
+      <a:lstStyle/>
+      <a:style>
+        <a:lnRef idx="2">
+          <a:schemeClr val="accent1"/>
+        </a:lnRef>
+        <a:fillRef idx="0">
+          <a:schemeClr val="accent1"/>
+        </a:fillRef>
+        <a:effectRef idx="1">
+          <a:schemeClr val="accent1"/>
+        </a:effectRef>
+        <a:fontRef idx="minor">
+          <a:schemeClr val="tx1"/>
+        </a:fontRef>
+      </a:style>
+    </a:lnDef>
+  </a:objectDefaults>
+  <a:extraClrSchemeLst/>
+  <a:extLst>
+    <a:ext uri="{05A4C25C-085E-4340-85A3-A5531E510DB2}">
+      <thm15:themeFamily xmlns:thm15="http://schemas.microsoft.com/office/thememl/2012/main" name="Office Theme" id="{2E142A2C-CD16-42D6-873A-C26D2A0506FA}" vid="{1BDDFF52-6CD6-40A5-AB3C-68EB2F1E4D0A}"/>
+    </a:ext>
+  </a:extLst>
+</a:theme>
 </file>
</xml_diff>